<commit_message>
Ship AI Design Doc Update
</commit_message>
<xml_diff>
--- a/GameDesignDocuments/GameDesignFigureMaker.pptx
+++ b/GameDesignDocuments/GameDesignFigureMaker.pptx
@@ -10,7 +10,10 @@
     <p:sldId id="256" r:id="rId4"/>
     <p:sldId id="257" r:id="rId5"/>
     <p:sldId id="259" r:id="rId6"/>
-    <p:sldId id="261" r:id="rId7"/>
+    <p:sldId id="262" r:id="rId7"/>
+    <p:sldId id="264" r:id="rId8"/>
+    <p:sldId id="261" r:id="rId9"/>
+    <p:sldId id="263" r:id="rId10"/>
   </p:sldIdLst>
   <p:sldSz cx="12192000" cy="6858000"/>
   <p:notesSz cx="6858000" cy="9144000"/>
@@ -109,6 +112,11 @@
       </a:defRPr>
     </a:lvl9pPr>
   </p:defaultTextStyle>
+  <p:extLst>
+    <p:ext uri="{EFAFB233-063F-42B5-8137-9DF3F51BA10A}">
+      <p15:sldGuideLst xmlns:p15="http://schemas.microsoft.com/office/powerpoint/2012/main"/>
+    </p:ext>
+  </p:extLst>
 </p:presentation>
 </file>
 
@@ -259,7 +267,7 @@
           <a:p>
             <a:fld id="{0EDEDBBF-13BB-4A5A-A2EB-F4BAB57525A5}" type="datetimeFigureOut">
               <a:rPr lang="en-US" smtClean="0"/>
-              <a:t>1/16/2022</a:t>
+              <a:t>1/24/2022</a:t>
             </a:fld>
             <a:endParaRPr lang="en-US"/>
           </a:p>
@@ -457,7 +465,7 @@
           <a:p>
             <a:fld id="{0EDEDBBF-13BB-4A5A-A2EB-F4BAB57525A5}" type="datetimeFigureOut">
               <a:rPr lang="en-US" smtClean="0"/>
-              <a:t>1/16/2022</a:t>
+              <a:t>1/24/2022</a:t>
             </a:fld>
             <a:endParaRPr lang="en-US"/>
           </a:p>
@@ -665,7 +673,7 @@
           <a:p>
             <a:fld id="{0EDEDBBF-13BB-4A5A-A2EB-F4BAB57525A5}" type="datetimeFigureOut">
               <a:rPr lang="en-US" smtClean="0"/>
-              <a:t>1/16/2022</a:t>
+              <a:t>1/24/2022</a:t>
             </a:fld>
             <a:endParaRPr lang="en-US"/>
           </a:p>
@@ -863,7 +871,7 @@
           <a:p>
             <a:fld id="{0EDEDBBF-13BB-4A5A-A2EB-F4BAB57525A5}" type="datetimeFigureOut">
               <a:rPr lang="en-US" smtClean="0"/>
-              <a:t>1/16/2022</a:t>
+              <a:t>1/24/2022</a:t>
             </a:fld>
             <a:endParaRPr lang="en-US"/>
           </a:p>
@@ -1138,7 +1146,7 @@
           <a:p>
             <a:fld id="{0EDEDBBF-13BB-4A5A-A2EB-F4BAB57525A5}" type="datetimeFigureOut">
               <a:rPr lang="en-US" smtClean="0"/>
-              <a:t>1/16/2022</a:t>
+              <a:t>1/24/2022</a:t>
             </a:fld>
             <a:endParaRPr lang="en-US"/>
           </a:p>
@@ -1403,7 +1411,7 @@
           <a:p>
             <a:fld id="{0EDEDBBF-13BB-4A5A-A2EB-F4BAB57525A5}" type="datetimeFigureOut">
               <a:rPr lang="en-US" smtClean="0"/>
-              <a:t>1/16/2022</a:t>
+              <a:t>1/24/2022</a:t>
             </a:fld>
             <a:endParaRPr lang="en-US"/>
           </a:p>
@@ -1815,7 +1823,7 @@
           <a:p>
             <a:fld id="{0EDEDBBF-13BB-4A5A-A2EB-F4BAB57525A5}" type="datetimeFigureOut">
               <a:rPr lang="en-US" smtClean="0"/>
-              <a:t>1/16/2022</a:t>
+              <a:t>1/24/2022</a:t>
             </a:fld>
             <a:endParaRPr lang="en-US"/>
           </a:p>
@@ -1956,7 +1964,7 @@
           <a:p>
             <a:fld id="{0EDEDBBF-13BB-4A5A-A2EB-F4BAB57525A5}" type="datetimeFigureOut">
               <a:rPr lang="en-US" smtClean="0"/>
-              <a:t>1/16/2022</a:t>
+              <a:t>1/24/2022</a:t>
             </a:fld>
             <a:endParaRPr lang="en-US"/>
           </a:p>
@@ -2069,7 +2077,7 @@
           <a:p>
             <a:fld id="{0EDEDBBF-13BB-4A5A-A2EB-F4BAB57525A5}" type="datetimeFigureOut">
               <a:rPr lang="en-US" smtClean="0"/>
-              <a:t>1/16/2022</a:t>
+              <a:t>1/24/2022</a:t>
             </a:fld>
             <a:endParaRPr lang="en-US"/>
           </a:p>
@@ -2380,7 +2388,7 @@
           <a:p>
             <a:fld id="{0EDEDBBF-13BB-4A5A-A2EB-F4BAB57525A5}" type="datetimeFigureOut">
               <a:rPr lang="en-US" smtClean="0"/>
-              <a:t>1/16/2022</a:t>
+              <a:t>1/24/2022</a:t>
             </a:fld>
             <a:endParaRPr lang="en-US"/>
           </a:p>
@@ -2668,7 +2676,7 @@
           <a:p>
             <a:fld id="{0EDEDBBF-13BB-4A5A-A2EB-F4BAB57525A5}" type="datetimeFigureOut">
               <a:rPr lang="en-US" smtClean="0"/>
-              <a:t>1/16/2022</a:t>
+              <a:t>1/24/2022</a:t>
             </a:fld>
             <a:endParaRPr lang="en-US"/>
           </a:p>
@@ -2909,7 +2917,7 @@
           <a:p>
             <a:fld id="{0EDEDBBF-13BB-4A5A-A2EB-F4BAB57525A5}" type="datetimeFigureOut">
               <a:rPr lang="en-US" smtClean="0"/>
-              <a:t>1/16/2022</a:t>
+              <a:t>1/24/2022</a:t>
             </a:fld>
             <a:endParaRPr lang="en-US"/>
           </a:p>
@@ -3475,7 +3483,7 @@
         <p:spPr>
           <a:xfrm>
             <a:off x="3823582" y="2321004"/>
-            <a:ext cx="4544834" cy="1107996"/>
+            <a:ext cx="5379999" cy="1107996"/>
           </a:xfrm>
           <a:prstGeom prst="rect">
             <a:avLst/>
@@ -3494,7 +3502,7 @@
                   <a:schemeClr val="bg1"/>
                 </a:solidFill>
               </a:rPr>
-              <a:t>UI Design V1</a:t>
+              <a:t>HUD Design V1</a:t>
             </a:r>
             <a:endParaRPr lang="en-US" sz="4400" dirty="0">
               <a:solidFill>
@@ -4555,8 +4563,8 @@
         </p:nvSpPr>
         <p:spPr>
           <a:xfrm>
-            <a:off x="4395388" y="114300"/>
-            <a:ext cx="3817648" cy="584775"/>
+            <a:off x="3872279" y="97522"/>
+            <a:ext cx="4130233" cy="584775"/>
           </a:xfrm>
           <a:prstGeom prst="rect">
             <a:avLst/>
@@ -4569,13 +4577,14 @@
           </a:bodyPr>
           <a:lstStyle/>
           <a:p>
+            <a:pPr algn="ctr"/>
             <a:r>
               <a:rPr lang="en-US" sz="3200" dirty="0">
                 <a:solidFill>
                   <a:schemeClr val="bg1"/>
                 </a:solidFill>
               </a:rPr>
-              <a:t>Basic “Bar” UI Design</a:t>
+              <a:t>Basic “Bar” HUD Design</a:t>
             </a:r>
             <a:endParaRPr lang="en-US" dirty="0">
               <a:solidFill>
@@ -5465,8 +5474,8 @@
         </p:nvSpPr>
         <p:spPr>
           <a:xfrm>
-            <a:off x="3966763" y="114300"/>
-            <a:ext cx="4588692" cy="584775"/>
+            <a:off x="3160893" y="89133"/>
+            <a:ext cx="4994252" cy="584775"/>
           </a:xfrm>
           <a:prstGeom prst="rect">
             <a:avLst/>
@@ -5479,13 +5488,14 @@
           </a:bodyPr>
           <a:lstStyle/>
           <a:p>
+            <a:pPr algn="ctr"/>
             <a:r>
               <a:rPr lang="en-US" sz="3200" dirty="0">
                 <a:solidFill>
                   <a:schemeClr val="bg1"/>
                 </a:solidFill>
               </a:rPr>
-              <a:t>Combined “Bar” UI Design</a:t>
+              <a:t>Combined “Bar” HUD Design</a:t>
             </a:r>
             <a:endParaRPr lang="en-US" dirty="0">
               <a:solidFill>
@@ -6307,8 +6317,8 @@
         </p:nvSpPr>
         <p:spPr>
           <a:xfrm>
-            <a:off x="3966763" y="114300"/>
-            <a:ext cx="3681649" cy="584775"/>
+            <a:off x="3743346" y="131078"/>
+            <a:ext cx="3994235" cy="584775"/>
           </a:xfrm>
           <a:prstGeom prst="rect">
             <a:avLst/>
@@ -6321,13 +6331,14 @@
           </a:bodyPr>
           <a:lstStyle/>
           <a:p>
+            <a:pPr algn="ctr"/>
             <a:r>
               <a:rPr lang="en-US" sz="3200" dirty="0">
                 <a:solidFill>
                   <a:schemeClr val="bg1"/>
                 </a:solidFill>
               </a:rPr>
-              <a:t>Integrated UI Design</a:t>
+              <a:t>Integrated HUD Design</a:t>
             </a:r>
             <a:endParaRPr lang="en-US" dirty="0">
               <a:solidFill>
@@ -6943,7 +6954,3920 @@
     </p:spTree>
     <p:extLst>
       <p:ext uri="{BB962C8B-B14F-4D97-AF65-F5344CB8AC3E}">
+        <p14:creationId xmlns:p14="http://schemas.microsoft.com/office/powerpoint/2010/main" val="3684257317"/>
+      </p:ext>
+    </p:extLst>
+  </p:cSld>
+  <p:clrMapOvr>
+    <a:masterClrMapping/>
+  </p:clrMapOvr>
+</p:sld>
+</file>
+
+<file path=ppt/slides/slide7.xml><?xml version="1.0" encoding="utf-8"?>
+<p:sld xmlns:a="http://schemas.openxmlformats.org/drawingml/2006/main" xmlns:r="http://schemas.openxmlformats.org/officeDocument/2006/relationships" xmlns:p="http://schemas.openxmlformats.org/presentationml/2006/main">
+  <p:cSld>
+    <p:bg>
+      <p:bgPr>
+        <a:solidFill>
+          <a:schemeClr val="tx1"/>
+        </a:solidFill>
+        <a:effectLst/>
+      </p:bgPr>
+    </p:bg>
+    <p:spTree>
+      <p:nvGrpSpPr>
+        <p:cNvPr id="1" name=""/>
+        <p:cNvGrpSpPr/>
+        <p:nvPr/>
+      </p:nvGrpSpPr>
+      <p:grpSpPr>
+        <a:xfrm>
+          <a:off x="0" y="0"/>
+          <a:ext cx="0" cy="0"/>
+          <a:chOff x="0" y="0"/>
+          <a:chExt cx="0" cy="0"/>
+        </a:xfrm>
+      </p:grpSpPr>
+      <p:sp>
+        <p:nvSpPr>
+          <p:cNvPr id="45" name="Rectangle: Rounded Corners 44">
+            <a:extLst>
+              <a:ext uri="{FF2B5EF4-FFF2-40B4-BE49-F238E27FC236}">
+                <a16:creationId xmlns:a16="http://schemas.microsoft.com/office/drawing/2014/main" id="{869308EC-C893-44B0-A9E2-D354470842F4}"/>
+              </a:ext>
+            </a:extLst>
+          </p:cNvPr>
+          <p:cNvSpPr/>
+          <p:nvPr/>
+        </p:nvSpPr>
+        <p:spPr>
+          <a:xfrm>
+            <a:off x="434603" y="3304240"/>
+            <a:ext cx="3579698" cy="738664"/>
+          </a:xfrm>
+          <a:prstGeom prst="roundRect">
+            <a:avLst/>
+          </a:prstGeom>
+          <a:solidFill>
+            <a:schemeClr val="bg2">
+              <a:lumMod val="25000"/>
+            </a:schemeClr>
+          </a:solidFill>
+          <a:ln>
+            <a:solidFill>
+              <a:schemeClr val="bg2">
+                <a:lumMod val="25000"/>
+              </a:schemeClr>
+            </a:solidFill>
+          </a:ln>
+        </p:spPr>
+        <p:style>
+          <a:lnRef idx="2">
+            <a:schemeClr val="accent1">
+              <a:shade val="50000"/>
+            </a:schemeClr>
+          </a:lnRef>
+          <a:fillRef idx="1">
+            <a:schemeClr val="accent1"/>
+          </a:fillRef>
+          <a:effectRef idx="0">
+            <a:schemeClr val="accent1"/>
+          </a:effectRef>
+          <a:fontRef idx="minor">
+            <a:schemeClr val="lt1"/>
+          </a:fontRef>
+        </p:style>
+        <p:txBody>
+          <a:bodyPr rtlCol="0" anchor="ctr"/>
+          <a:lstStyle/>
+          <a:p>
+            <a:pPr algn="ctr"/>
+            <a:endParaRPr lang="en-US"/>
+          </a:p>
+        </p:txBody>
+      </p:sp>
+      <p:sp>
+        <p:nvSpPr>
+          <p:cNvPr id="3" name="Isosceles Triangle 2">
+            <a:extLst>
+              <a:ext uri="{FF2B5EF4-FFF2-40B4-BE49-F238E27FC236}">
+                <a16:creationId xmlns:a16="http://schemas.microsoft.com/office/drawing/2014/main" id="{DA7622A9-817A-4D51-919E-415116300416}"/>
+              </a:ext>
+            </a:extLst>
+          </p:cNvPr>
+          <p:cNvSpPr/>
+          <p:nvPr/>
+        </p:nvSpPr>
+        <p:spPr>
+          <a:xfrm rot="4262100">
+            <a:off x="5623832" y="3913414"/>
+            <a:ext cx="233265" cy="326572"/>
+          </a:xfrm>
+          <a:prstGeom prst="triangle">
+            <a:avLst/>
+          </a:prstGeom>
+          <a:solidFill>
+            <a:schemeClr val="bg1"/>
+          </a:solidFill>
+          <a:ln>
+            <a:solidFill>
+              <a:schemeClr val="bg1"/>
+            </a:solidFill>
+          </a:ln>
+        </p:spPr>
+        <p:style>
+          <a:lnRef idx="2">
+            <a:schemeClr val="accent1">
+              <a:shade val="50000"/>
+            </a:schemeClr>
+          </a:lnRef>
+          <a:fillRef idx="1">
+            <a:schemeClr val="accent1"/>
+          </a:fillRef>
+          <a:effectRef idx="0">
+            <a:schemeClr val="accent1"/>
+          </a:effectRef>
+          <a:fontRef idx="minor">
+            <a:schemeClr val="lt1"/>
+          </a:fontRef>
+        </p:style>
+        <p:txBody>
+          <a:bodyPr rtlCol="0" anchor="ctr"/>
+          <a:lstStyle/>
+          <a:p>
+            <a:pPr algn="ctr"/>
+            <a:endParaRPr lang="en-US"/>
+          </a:p>
+        </p:txBody>
+      </p:sp>
+      <p:sp>
+        <p:nvSpPr>
+          <p:cNvPr id="10" name="Oval 9">
+            <a:extLst>
+              <a:ext uri="{FF2B5EF4-FFF2-40B4-BE49-F238E27FC236}">
+                <a16:creationId xmlns:a16="http://schemas.microsoft.com/office/drawing/2014/main" id="{C2B2B493-1F74-4F46-B9BF-9EFF645B2F98}"/>
+              </a:ext>
+            </a:extLst>
+          </p:cNvPr>
+          <p:cNvSpPr>
+            <a:spLocks noChangeAspect="1"/>
+          </p:cNvSpPr>
+          <p:nvPr/>
+        </p:nvSpPr>
+        <p:spPr>
+          <a:xfrm>
+            <a:off x="7627119" y="1924738"/>
+            <a:ext cx="274320" cy="274320"/>
+          </a:xfrm>
+          <a:prstGeom prst="ellipse">
+            <a:avLst/>
+          </a:prstGeom>
+          <a:solidFill>
+            <a:schemeClr val="bg1">
+              <a:lumMod val="65000"/>
+            </a:schemeClr>
+          </a:solidFill>
+          <a:ln>
+            <a:solidFill>
+              <a:schemeClr val="bg1">
+                <a:lumMod val="65000"/>
+              </a:schemeClr>
+            </a:solidFill>
+          </a:ln>
+        </p:spPr>
+        <p:style>
+          <a:lnRef idx="2">
+            <a:schemeClr val="accent1">
+              <a:shade val="50000"/>
+            </a:schemeClr>
+          </a:lnRef>
+          <a:fillRef idx="1">
+            <a:schemeClr val="accent1"/>
+          </a:fillRef>
+          <a:effectRef idx="0">
+            <a:schemeClr val="accent1"/>
+          </a:effectRef>
+          <a:fontRef idx="minor">
+            <a:schemeClr val="lt1"/>
+          </a:fontRef>
+        </p:style>
+        <p:txBody>
+          <a:bodyPr rtlCol="0" anchor="ctr"/>
+          <a:lstStyle/>
+          <a:p>
+            <a:pPr algn="ctr"/>
+            <a:endParaRPr lang="en-US" dirty="0"/>
+          </a:p>
+        </p:txBody>
+      </p:sp>
+      <p:sp>
+        <p:nvSpPr>
+          <p:cNvPr id="12" name="Oval 11">
+            <a:extLst>
+              <a:ext uri="{FF2B5EF4-FFF2-40B4-BE49-F238E27FC236}">
+                <a16:creationId xmlns:a16="http://schemas.microsoft.com/office/drawing/2014/main" id="{246F53E2-7237-468D-A46F-D774148943AE}"/>
+              </a:ext>
+            </a:extLst>
+          </p:cNvPr>
+          <p:cNvSpPr>
+            <a:spLocks noChangeAspect="1"/>
+          </p:cNvSpPr>
+          <p:nvPr/>
+        </p:nvSpPr>
+        <p:spPr>
+          <a:xfrm>
+            <a:off x="5894692" y="3963324"/>
+            <a:ext cx="91440" cy="91440"/>
+          </a:xfrm>
+          <a:prstGeom prst="ellipse">
+            <a:avLst/>
+          </a:prstGeom>
+          <a:solidFill>
+            <a:schemeClr val="bg1"/>
+          </a:solidFill>
+          <a:ln>
+            <a:solidFill>
+              <a:schemeClr val="bg1">
+                <a:lumMod val="65000"/>
+              </a:schemeClr>
+            </a:solidFill>
+          </a:ln>
+        </p:spPr>
+        <p:style>
+          <a:lnRef idx="2">
+            <a:schemeClr val="accent1">
+              <a:shade val="50000"/>
+            </a:schemeClr>
+          </a:lnRef>
+          <a:fillRef idx="1">
+            <a:schemeClr val="accent1"/>
+          </a:fillRef>
+          <a:effectRef idx="0">
+            <a:schemeClr val="accent1"/>
+          </a:effectRef>
+          <a:fontRef idx="minor">
+            <a:schemeClr val="lt1"/>
+          </a:fontRef>
+        </p:style>
+        <p:txBody>
+          <a:bodyPr rtlCol="0" anchor="ctr"/>
+          <a:lstStyle/>
+          <a:p>
+            <a:pPr algn="ctr"/>
+            <a:endParaRPr lang="en-US"/>
+          </a:p>
+        </p:txBody>
+      </p:sp>
+      <p:sp>
+        <p:nvSpPr>
+          <p:cNvPr id="17" name="TextBox 16">
+            <a:extLst>
+              <a:ext uri="{FF2B5EF4-FFF2-40B4-BE49-F238E27FC236}">
+                <a16:creationId xmlns:a16="http://schemas.microsoft.com/office/drawing/2014/main" id="{D717D228-C992-421A-B5BB-B04E1CC1DCA5}"/>
+              </a:ext>
+            </a:extLst>
+          </p:cNvPr>
+          <p:cNvSpPr txBox="1"/>
+          <p:nvPr/>
+        </p:nvSpPr>
+        <p:spPr>
+          <a:xfrm>
+            <a:off x="4945791" y="97522"/>
+            <a:ext cx="1983235" cy="584775"/>
+          </a:xfrm>
+          <a:prstGeom prst="rect">
+            <a:avLst/>
+          </a:prstGeom>
+          <a:noFill/>
+        </p:spPr>
+        <p:txBody>
+          <a:bodyPr wrap="none" rtlCol="0">
+            <a:spAutoFit/>
+          </a:bodyPr>
+          <a:lstStyle/>
+          <a:p>
+            <a:pPr algn="ctr"/>
+            <a:r>
+              <a:rPr lang="en-US" sz="3200" dirty="0">
+                <a:solidFill>
+                  <a:schemeClr val="bg1"/>
+                </a:solidFill>
+              </a:rPr>
+              <a:t>Shot Angle</a:t>
+            </a:r>
+            <a:endParaRPr lang="en-US" dirty="0">
+              <a:solidFill>
+                <a:schemeClr val="bg1"/>
+              </a:solidFill>
+            </a:endParaRPr>
+          </a:p>
+        </p:txBody>
+      </p:sp>
+      <p:sp>
+        <p:nvSpPr>
+          <p:cNvPr id="23" name="TextBox 22">
+            <a:extLst>
+              <a:ext uri="{FF2B5EF4-FFF2-40B4-BE49-F238E27FC236}">
+                <a16:creationId xmlns:a16="http://schemas.microsoft.com/office/drawing/2014/main" id="{174FDE56-DFDC-4645-AC36-85162AA5C8D9}"/>
+              </a:ext>
+            </a:extLst>
+          </p:cNvPr>
+          <p:cNvSpPr txBox="1"/>
+          <p:nvPr/>
+        </p:nvSpPr>
+        <p:spPr>
+          <a:xfrm>
+            <a:off x="136843" y="1173251"/>
+            <a:ext cx="2796857" cy="1323439"/>
+          </a:xfrm>
+          <a:prstGeom prst="rect">
+            <a:avLst/>
+          </a:prstGeom>
+          <a:noFill/>
+        </p:spPr>
+        <p:txBody>
+          <a:bodyPr wrap="square" rtlCol="0">
+            <a:spAutoFit/>
+          </a:bodyPr>
+          <a:lstStyle/>
+          <a:p>
+            <a:r>
+              <a:rPr lang="en-US" sz="1400" dirty="0">
+                <a:solidFill>
+                  <a:schemeClr val="bg1"/>
+                </a:solidFill>
+              </a:rPr>
+              <a:t>Since everything is moving and the bullets aren’t instant, we need to compute the angle to shoot at if we want to hit the moving target. The equation is below.</a:t>
+            </a:r>
+          </a:p>
+          <a:p>
+            <a:endParaRPr lang="en-US" sz="1000" dirty="0">
+              <a:solidFill>
+                <a:schemeClr val="bg1"/>
+              </a:solidFill>
+            </a:endParaRPr>
+          </a:p>
+        </p:txBody>
+      </p:sp>
+      <p:sp>
+        <p:nvSpPr>
+          <p:cNvPr id="7" name="Arrow: Right 6">
+            <a:extLst>
+              <a:ext uri="{FF2B5EF4-FFF2-40B4-BE49-F238E27FC236}">
+                <a16:creationId xmlns:a16="http://schemas.microsoft.com/office/drawing/2014/main" id="{3B177623-1F16-4D6E-8291-3261A2150572}"/>
+              </a:ext>
+            </a:extLst>
+          </p:cNvPr>
+          <p:cNvSpPr/>
+          <p:nvPr/>
+        </p:nvSpPr>
+        <p:spPr>
+          <a:xfrm rot="2616006">
+            <a:off x="7658820" y="2290375"/>
+            <a:ext cx="823185" cy="122095"/>
+          </a:xfrm>
+          <a:prstGeom prst="rightArrow">
+            <a:avLst/>
+          </a:prstGeom>
+          <a:solidFill>
+            <a:srgbClr val="A6A6A6"/>
+          </a:solidFill>
+          <a:ln>
+            <a:noFill/>
+          </a:ln>
+        </p:spPr>
+        <p:style>
+          <a:lnRef idx="2">
+            <a:schemeClr val="accent1">
+              <a:shade val="50000"/>
+            </a:schemeClr>
+          </a:lnRef>
+          <a:fillRef idx="1">
+            <a:schemeClr val="accent1"/>
+          </a:fillRef>
+          <a:effectRef idx="0">
+            <a:schemeClr val="accent1"/>
+          </a:effectRef>
+          <a:fontRef idx="minor">
+            <a:schemeClr val="lt1"/>
+          </a:fontRef>
+        </p:style>
+        <p:txBody>
+          <a:bodyPr rtlCol="0" anchor="ctr"/>
+          <a:lstStyle/>
+          <a:p>
+            <a:pPr algn="ctr"/>
+            <a:endParaRPr lang="en-US"/>
+          </a:p>
+        </p:txBody>
+      </p:sp>
+      <p:sp>
+        <p:nvSpPr>
+          <p:cNvPr id="8" name="TextBox 7">
+            <a:extLst>
+              <a:ext uri="{FF2B5EF4-FFF2-40B4-BE49-F238E27FC236}">
+                <a16:creationId xmlns:a16="http://schemas.microsoft.com/office/drawing/2014/main" id="{5F07C545-D2B3-493C-859B-4B45C4E928F0}"/>
+              </a:ext>
+            </a:extLst>
+          </p:cNvPr>
+          <p:cNvSpPr txBox="1"/>
+          <p:nvPr/>
+        </p:nvSpPr>
+        <p:spPr>
+          <a:xfrm>
+            <a:off x="6539160" y="1426328"/>
+            <a:ext cx="2556918" cy="369332"/>
+          </a:xfrm>
+          <a:prstGeom prst="rect">
+            <a:avLst/>
+          </a:prstGeom>
+          <a:noFill/>
+        </p:spPr>
+        <p:txBody>
+          <a:bodyPr wrap="none" rtlCol="0">
+            <a:spAutoFit/>
+          </a:bodyPr>
+          <a:lstStyle/>
+          <a:p>
+            <a:r>
+              <a:rPr lang="en-US" dirty="0">
+                <a:solidFill>
+                  <a:schemeClr val="bg1"/>
+                </a:solidFill>
+              </a:rPr>
+              <a:t>Asteroid Starting Position</a:t>
+            </a:r>
+          </a:p>
+        </p:txBody>
+      </p:sp>
+      <mc:AlternateContent xmlns:mc="http://schemas.openxmlformats.org/markup-compatibility/2006" xmlns:a14="http://schemas.microsoft.com/office/drawing/2010/main">
+        <mc:Choice Requires="a14">
+          <p:sp>
+            <p:nvSpPr>
+              <p:cNvPr id="18" name="TextBox 17">
+                <a:extLst>
+                  <a:ext uri="{FF2B5EF4-FFF2-40B4-BE49-F238E27FC236}">
+                    <a16:creationId xmlns:a16="http://schemas.microsoft.com/office/drawing/2014/main" id="{3FC25949-828E-4EC0-B62C-18B897E622F3}"/>
+                  </a:ext>
+                </a:extLst>
+              </p:cNvPr>
+              <p:cNvSpPr txBox="1"/>
+              <p:nvPr/>
+            </p:nvSpPr>
+            <p:spPr>
+              <a:xfrm>
+                <a:off x="6712719" y="1834970"/>
+                <a:ext cx="914400" cy="369332"/>
+              </a:xfrm>
+              <a:prstGeom prst="rect">
+                <a:avLst/>
+              </a:prstGeom>
+              <a:noFill/>
+            </p:spPr>
+            <p:txBody>
+              <a:bodyPr wrap="square" rtlCol="0">
+                <a:spAutoFit/>
+              </a:bodyPr>
+              <a:lstStyle/>
+              <a:p>
+                <a:pPr/>
+                <a14:m>
+                  <m:oMathPara xmlns:m="http://schemas.openxmlformats.org/officeDocument/2006/math">
+                    <m:oMathParaPr>
+                      <m:jc m:val="centerGroup"/>
+                    </m:oMathParaPr>
+                    <m:oMath xmlns:m="http://schemas.openxmlformats.org/officeDocument/2006/math">
+                      <m:d>
+                        <m:dPr>
+                          <m:ctrlPr>
+                            <a:rPr lang="en-US" b="0" i="1" smtClean="0">
+                              <a:solidFill>
+                                <a:schemeClr val="bg1"/>
+                              </a:solidFill>
+                              <a:latin typeface="Cambria Math" panose="02040503050406030204" pitchFamily="18" charset="0"/>
+                            </a:rPr>
+                          </m:ctrlPr>
+                        </m:dPr>
+                        <m:e>
+                          <m:r>
+                            <a:rPr lang="en-US" b="0" i="1" smtClean="0">
+                              <a:solidFill>
+                                <a:schemeClr val="bg1"/>
+                              </a:solidFill>
+                              <a:latin typeface="Cambria Math" panose="02040503050406030204" pitchFamily="18" charset="0"/>
+                            </a:rPr>
+                            <m:t>𝑥</m:t>
+                          </m:r>
+                          <m:r>
+                            <a:rPr lang="en-US" b="0" i="1" smtClean="0">
+                              <a:solidFill>
+                                <a:schemeClr val="bg1"/>
+                              </a:solidFill>
+                              <a:latin typeface="Cambria Math" panose="02040503050406030204" pitchFamily="18" charset="0"/>
+                            </a:rPr>
+                            <m:t>,</m:t>
+                          </m:r>
+                          <m:r>
+                            <a:rPr lang="en-US" b="0" i="1" smtClean="0">
+                              <a:solidFill>
+                                <a:schemeClr val="bg1"/>
+                              </a:solidFill>
+                              <a:latin typeface="Cambria Math" panose="02040503050406030204" pitchFamily="18" charset="0"/>
+                            </a:rPr>
+                            <m:t>𝑦</m:t>
+                          </m:r>
+                        </m:e>
+                      </m:d>
+                    </m:oMath>
+                  </m:oMathPara>
+                </a14:m>
+                <a:endParaRPr lang="en-US" b="0" dirty="0">
+                  <a:solidFill>
+                    <a:schemeClr val="bg1"/>
+                  </a:solidFill>
+                </a:endParaRPr>
+              </a:p>
+            </p:txBody>
+          </p:sp>
+        </mc:Choice>
+        <mc:Fallback xmlns="">
+          <p:sp>
+            <p:nvSpPr>
+              <p:cNvPr id="18" name="TextBox 17">
+                <a:extLst>
+                  <a:ext uri="{FF2B5EF4-FFF2-40B4-BE49-F238E27FC236}">
+                    <a16:creationId xmlns:a16="http://schemas.microsoft.com/office/drawing/2014/main" id="{3FC25949-828E-4EC0-B62C-18B897E622F3}"/>
+                  </a:ext>
+                </a:extLst>
+              </p:cNvPr>
+              <p:cNvSpPr txBox="1">
+                <a:spLocks noRot="1" noChangeAspect="1" noMove="1" noResize="1" noEditPoints="1" noAdjustHandles="1" noChangeArrowheads="1" noChangeShapeType="1" noTextEdit="1"/>
+              </p:cNvSpPr>
+              <p:nvPr/>
+            </p:nvSpPr>
+            <p:spPr>
+              <a:xfrm>
+                <a:off x="6712719" y="1834970"/>
+                <a:ext cx="914400" cy="369332"/>
+              </a:xfrm>
+              <a:prstGeom prst="rect">
+                <a:avLst/>
+              </a:prstGeom>
+              <a:blipFill>
+                <a:blip r:embed="rId2"/>
+                <a:stretch>
+                  <a:fillRect b="-6557"/>
+                </a:stretch>
+              </a:blipFill>
+            </p:spPr>
+            <p:txBody>
+              <a:bodyPr/>
+              <a:lstStyle/>
+              <a:p>
+                <a:r>
+                  <a:rPr lang="en-US">
+                    <a:noFill/>
+                  </a:rPr>
+                  <a:t> </a:t>
+                </a:r>
+              </a:p>
+            </p:txBody>
+          </p:sp>
+        </mc:Fallback>
+      </mc:AlternateContent>
+      <mc:AlternateContent xmlns:mc="http://schemas.openxmlformats.org/markup-compatibility/2006" xmlns:a14="http://schemas.microsoft.com/office/drawing/2010/main">
+        <mc:Choice Requires="a14">
+          <p:sp>
+            <p:nvSpPr>
+              <p:cNvPr id="24" name="TextBox 23">
+                <a:extLst>
+                  <a:ext uri="{FF2B5EF4-FFF2-40B4-BE49-F238E27FC236}">
+                    <a16:creationId xmlns:a16="http://schemas.microsoft.com/office/drawing/2014/main" id="{39D9797C-8480-4636-A378-66A2BA01E365}"/>
+                  </a:ext>
+                </a:extLst>
+              </p:cNvPr>
+              <p:cNvSpPr txBox="1"/>
+              <p:nvPr/>
+            </p:nvSpPr>
+            <p:spPr>
+              <a:xfrm>
+                <a:off x="7757848" y="2223219"/>
+                <a:ext cx="354070" cy="369332"/>
+              </a:xfrm>
+              <a:prstGeom prst="rect">
+                <a:avLst/>
+              </a:prstGeom>
+              <a:noFill/>
+            </p:spPr>
+            <p:txBody>
+              <a:bodyPr wrap="square" rtlCol="0">
+                <a:spAutoFit/>
+              </a:bodyPr>
+              <a:lstStyle/>
+              <a:p>
+                <a:pPr/>
+                <a14:m>
+                  <m:oMathPara xmlns:m="http://schemas.openxmlformats.org/officeDocument/2006/math">
+                    <m:oMathParaPr>
+                      <m:jc m:val="centerGroup"/>
+                    </m:oMathParaPr>
+                    <m:oMath xmlns:m="http://schemas.openxmlformats.org/officeDocument/2006/math">
+                      <m:r>
+                        <a:rPr lang="en-US" b="0" i="1" smtClean="0">
+                          <a:solidFill>
+                            <a:schemeClr val="bg1"/>
+                          </a:solidFill>
+                          <a:latin typeface="Cambria Math" panose="02040503050406030204" pitchFamily="18" charset="0"/>
+                        </a:rPr>
+                        <m:t>𝑣</m:t>
+                      </m:r>
+                    </m:oMath>
+                  </m:oMathPara>
+                </a14:m>
+                <a:endParaRPr lang="en-US" b="0" dirty="0">
+                  <a:solidFill>
+                    <a:schemeClr val="bg1"/>
+                  </a:solidFill>
+                </a:endParaRPr>
+              </a:p>
+            </p:txBody>
+          </p:sp>
+        </mc:Choice>
+        <mc:Fallback xmlns="">
+          <p:sp>
+            <p:nvSpPr>
+              <p:cNvPr id="24" name="TextBox 23">
+                <a:extLst>
+                  <a:ext uri="{FF2B5EF4-FFF2-40B4-BE49-F238E27FC236}">
+                    <a16:creationId xmlns:a16="http://schemas.microsoft.com/office/drawing/2014/main" id="{39D9797C-8480-4636-A378-66A2BA01E365}"/>
+                  </a:ext>
+                </a:extLst>
+              </p:cNvPr>
+              <p:cNvSpPr txBox="1">
+                <a:spLocks noRot="1" noChangeAspect="1" noMove="1" noResize="1" noEditPoints="1" noAdjustHandles="1" noChangeArrowheads="1" noChangeShapeType="1" noTextEdit="1"/>
+              </p:cNvSpPr>
+              <p:nvPr/>
+            </p:nvSpPr>
+            <p:spPr>
+              <a:xfrm>
+                <a:off x="7757848" y="2223219"/>
+                <a:ext cx="354070" cy="369332"/>
+              </a:xfrm>
+              <a:prstGeom prst="rect">
+                <a:avLst/>
+              </a:prstGeom>
+              <a:blipFill>
+                <a:blip r:embed="rId3"/>
+                <a:stretch>
+                  <a:fillRect/>
+                </a:stretch>
+              </a:blipFill>
+            </p:spPr>
+            <p:txBody>
+              <a:bodyPr/>
+              <a:lstStyle/>
+              <a:p>
+                <a:r>
+                  <a:rPr lang="en-US">
+                    <a:noFill/>
+                  </a:rPr>
+                  <a:t> </a:t>
+                </a:r>
+              </a:p>
+            </p:txBody>
+          </p:sp>
+        </mc:Fallback>
+      </mc:AlternateContent>
+      <p:sp>
+        <p:nvSpPr>
+          <p:cNvPr id="25" name="Oval 24">
+            <a:extLst>
+              <a:ext uri="{FF2B5EF4-FFF2-40B4-BE49-F238E27FC236}">
+                <a16:creationId xmlns:a16="http://schemas.microsoft.com/office/drawing/2014/main" id="{A943ED71-9E53-40CD-96D1-59221227124B}"/>
+              </a:ext>
+            </a:extLst>
+          </p:cNvPr>
+          <p:cNvSpPr>
+            <a:spLocks noChangeAspect="1"/>
+          </p:cNvSpPr>
+          <p:nvPr/>
+        </p:nvSpPr>
+        <p:spPr>
+          <a:xfrm>
+            <a:off x="8706732" y="2890852"/>
+            <a:ext cx="274320" cy="274320"/>
+          </a:xfrm>
+          <a:prstGeom prst="ellipse">
+            <a:avLst/>
+          </a:prstGeom>
+          <a:noFill/>
+          <a:ln>
+            <a:solidFill>
+              <a:schemeClr val="bg1">
+                <a:lumMod val="65000"/>
+              </a:schemeClr>
+            </a:solidFill>
+            <a:prstDash val="dash"/>
+          </a:ln>
+        </p:spPr>
+        <p:style>
+          <a:lnRef idx="2">
+            <a:schemeClr val="accent1">
+              <a:shade val="50000"/>
+            </a:schemeClr>
+          </a:lnRef>
+          <a:fillRef idx="1">
+            <a:schemeClr val="accent1"/>
+          </a:fillRef>
+          <a:effectRef idx="0">
+            <a:schemeClr val="accent1"/>
+          </a:effectRef>
+          <a:fontRef idx="minor">
+            <a:schemeClr val="lt1"/>
+          </a:fontRef>
+        </p:style>
+        <p:txBody>
+          <a:bodyPr rtlCol="0" anchor="ctr"/>
+          <a:lstStyle/>
+          <a:p>
+            <a:pPr algn="ctr"/>
+            <a:endParaRPr lang="en-US" dirty="0"/>
+          </a:p>
+        </p:txBody>
+      </p:sp>
+      <p:sp>
+        <p:nvSpPr>
+          <p:cNvPr id="26" name="Oval 25">
+            <a:extLst>
+              <a:ext uri="{FF2B5EF4-FFF2-40B4-BE49-F238E27FC236}">
+                <a16:creationId xmlns:a16="http://schemas.microsoft.com/office/drawing/2014/main" id="{0095279F-6861-4AB0-834A-74B090203212}"/>
+              </a:ext>
+            </a:extLst>
+          </p:cNvPr>
+          <p:cNvSpPr>
+            <a:spLocks noChangeAspect="1"/>
+          </p:cNvSpPr>
+          <p:nvPr/>
+        </p:nvSpPr>
+        <p:spPr>
+          <a:xfrm>
+            <a:off x="8798172" y="2982292"/>
+            <a:ext cx="91440" cy="91440"/>
+          </a:xfrm>
+          <a:prstGeom prst="ellipse">
+            <a:avLst/>
+          </a:prstGeom>
+          <a:solidFill>
+            <a:schemeClr val="bg1"/>
+          </a:solidFill>
+          <a:ln>
+            <a:solidFill>
+              <a:schemeClr val="bg1">
+                <a:lumMod val="65000"/>
+              </a:schemeClr>
+            </a:solidFill>
+          </a:ln>
+        </p:spPr>
+        <p:style>
+          <a:lnRef idx="2">
+            <a:schemeClr val="accent1">
+              <a:shade val="50000"/>
+            </a:schemeClr>
+          </a:lnRef>
+          <a:fillRef idx="1">
+            <a:schemeClr val="accent1"/>
+          </a:fillRef>
+          <a:effectRef idx="0">
+            <a:schemeClr val="accent1"/>
+          </a:effectRef>
+          <a:fontRef idx="minor">
+            <a:schemeClr val="lt1"/>
+          </a:fontRef>
+        </p:style>
+        <p:txBody>
+          <a:bodyPr rtlCol="0" anchor="ctr"/>
+          <a:lstStyle/>
+          <a:p>
+            <a:pPr algn="ctr"/>
+            <a:endParaRPr lang="en-US"/>
+          </a:p>
+        </p:txBody>
+      </p:sp>
+      <p:cxnSp>
+        <p:nvCxnSpPr>
+          <p:cNvPr id="33" name="Straight Connector 32">
+            <a:extLst>
+              <a:ext uri="{FF2B5EF4-FFF2-40B4-BE49-F238E27FC236}">
+                <a16:creationId xmlns:a16="http://schemas.microsoft.com/office/drawing/2014/main" id="{BE101C4C-E9CD-4A6D-916A-6CDBC0F6D993}"/>
+              </a:ext>
+            </a:extLst>
+          </p:cNvPr>
+          <p:cNvCxnSpPr>
+            <a:cxnSpLocks/>
+          </p:cNvCxnSpPr>
+          <p:nvPr/>
+        </p:nvCxnSpPr>
+        <p:spPr>
+          <a:xfrm flipV="1">
+            <a:off x="5652250" y="2676587"/>
+            <a:ext cx="4266618" cy="1439907"/>
+          </a:xfrm>
+          <a:prstGeom prst="line">
+            <a:avLst/>
+          </a:prstGeom>
+          <a:ln>
+            <a:prstDash val="dash"/>
+          </a:ln>
+        </p:spPr>
+        <p:style>
+          <a:lnRef idx="1">
+            <a:schemeClr val="accent1"/>
+          </a:lnRef>
+          <a:fillRef idx="0">
+            <a:schemeClr val="accent1"/>
+          </a:fillRef>
+          <a:effectRef idx="0">
+            <a:schemeClr val="accent1"/>
+          </a:effectRef>
+          <a:fontRef idx="minor">
+            <a:schemeClr val="tx1"/>
+          </a:fontRef>
+        </p:style>
+      </p:cxnSp>
+      <p:sp>
+        <p:nvSpPr>
+          <p:cNvPr id="34" name="Arc 33">
+            <a:extLst>
+              <a:ext uri="{FF2B5EF4-FFF2-40B4-BE49-F238E27FC236}">
+                <a16:creationId xmlns:a16="http://schemas.microsoft.com/office/drawing/2014/main" id="{E782D30F-25E8-45AA-9100-D355F19ADC75}"/>
+              </a:ext>
+            </a:extLst>
+          </p:cNvPr>
+          <p:cNvSpPr>
+            <a:spLocks noChangeAspect="1"/>
+          </p:cNvSpPr>
+          <p:nvPr/>
+        </p:nvSpPr>
+        <p:spPr>
+          <a:xfrm>
+            <a:off x="6444284" y="1291304"/>
+            <a:ext cx="1828800" cy="1828800"/>
+          </a:xfrm>
+          <a:prstGeom prst="arc">
+            <a:avLst>
+              <a:gd name="adj1" fmla="val 21132425"/>
+              <a:gd name="adj2" fmla="val 950357"/>
+            </a:avLst>
+          </a:prstGeom>
+        </p:spPr>
+        <p:style>
+          <a:lnRef idx="1">
+            <a:schemeClr val="accent1"/>
+          </a:lnRef>
+          <a:fillRef idx="0">
+            <a:schemeClr val="accent1"/>
+          </a:fillRef>
+          <a:effectRef idx="0">
+            <a:schemeClr val="accent1"/>
+          </a:effectRef>
+          <a:fontRef idx="minor">
+            <a:schemeClr val="tx1"/>
+          </a:fontRef>
+        </p:style>
+        <p:txBody>
+          <a:bodyPr rtlCol="0" anchor="ctr"/>
+          <a:lstStyle/>
+          <a:p>
+            <a:pPr algn="ctr"/>
+            <a:endParaRPr lang="en-US"/>
+          </a:p>
+        </p:txBody>
+      </p:sp>
+      <p:cxnSp>
+        <p:nvCxnSpPr>
+          <p:cNvPr id="35" name="Straight Connector 34">
+            <a:extLst>
+              <a:ext uri="{FF2B5EF4-FFF2-40B4-BE49-F238E27FC236}">
+                <a16:creationId xmlns:a16="http://schemas.microsoft.com/office/drawing/2014/main" id="{E9EFCBAC-4AA0-4CA7-879C-F8DB72796DD3}"/>
+              </a:ext>
+            </a:extLst>
+          </p:cNvPr>
+          <p:cNvCxnSpPr>
+            <a:cxnSpLocks/>
+          </p:cNvCxnSpPr>
+          <p:nvPr/>
+        </p:nvCxnSpPr>
+        <p:spPr>
+          <a:xfrm flipV="1">
+            <a:off x="5652250" y="4076700"/>
+            <a:ext cx="4482350" cy="39221"/>
+          </a:xfrm>
+          <a:prstGeom prst="line">
+            <a:avLst/>
+          </a:prstGeom>
+          <a:ln>
+            <a:solidFill>
+              <a:schemeClr val="bg1"/>
+            </a:solidFill>
+            <a:prstDash val="dash"/>
+          </a:ln>
+        </p:spPr>
+        <p:style>
+          <a:lnRef idx="1">
+            <a:schemeClr val="accent1"/>
+          </a:lnRef>
+          <a:fillRef idx="0">
+            <a:schemeClr val="accent1"/>
+          </a:fillRef>
+          <a:effectRef idx="0">
+            <a:schemeClr val="accent1"/>
+          </a:effectRef>
+          <a:fontRef idx="minor">
+            <a:schemeClr val="tx1"/>
+          </a:fontRef>
+        </p:style>
+      </p:cxnSp>
+      <p:cxnSp>
+        <p:nvCxnSpPr>
+          <p:cNvPr id="37" name="Straight Connector 36">
+            <a:extLst>
+              <a:ext uri="{FF2B5EF4-FFF2-40B4-BE49-F238E27FC236}">
+                <a16:creationId xmlns:a16="http://schemas.microsoft.com/office/drawing/2014/main" id="{9899D369-0556-46A3-908E-00C3256E5135}"/>
+              </a:ext>
+            </a:extLst>
+          </p:cNvPr>
+          <p:cNvCxnSpPr>
+            <a:cxnSpLocks/>
+          </p:cNvCxnSpPr>
+          <p:nvPr/>
+        </p:nvCxnSpPr>
+        <p:spPr>
+          <a:xfrm flipH="1" flipV="1">
+            <a:off x="5652250" y="2098547"/>
+            <a:ext cx="0" cy="1950370"/>
+          </a:xfrm>
+          <a:prstGeom prst="line">
+            <a:avLst/>
+          </a:prstGeom>
+          <a:ln>
+            <a:solidFill>
+              <a:schemeClr val="bg1"/>
+            </a:solidFill>
+            <a:prstDash val="dash"/>
+          </a:ln>
+        </p:spPr>
+        <p:style>
+          <a:lnRef idx="1">
+            <a:schemeClr val="accent1"/>
+          </a:lnRef>
+          <a:fillRef idx="0">
+            <a:schemeClr val="accent1"/>
+          </a:fillRef>
+          <a:effectRef idx="0">
+            <a:schemeClr val="accent1"/>
+          </a:effectRef>
+          <a:fontRef idx="minor">
+            <a:schemeClr val="tx1"/>
+          </a:fontRef>
+        </p:style>
+      </p:cxnSp>
+      <mc:AlternateContent xmlns:mc="http://schemas.openxmlformats.org/markup-compatibility/2006" xmlns:a14="http://schemas.microsoft.com/office/drawing/2010/main">
+        <mc:Choice Requires="a14">
+          <p:sp>
+            <p:nvSpPr>
+              <p:cNvPr id="39" name="TextBox 38">
+                <a:extLst>
+                  <a:ext uri="{FF2B5EF4-FFF2-40B4-BE49-F238E27FC236}">
+                    <a16:creationId xmlns:a16="http://schemas.microsoft.com/office/drawing/2014/main" id="{3FC96503-2339-44C3-BA2C-E6A23020810A}"/>
+                  </a:ext>
+                </a:extLst>
+              </p:cNvPr>
+              <p:cNvSpPr txBox="1"/>
+              <p:nvPr/>
+            </p:nvSpPr>
+            <p:spPr>
+              <a:xfrm>
+                <a:off x="8362026" y="2175222"/>
+                <a:ext cx="189475" cy="276999"/>
+              </a:xfrm>
+              <a:prstGeom prst="rect">
+                <a:avLst/>
+              </a:prstGeom>
+              <a:noFill/>
+            </p:spPr>
+            <p:txBody>
+              <a:bodyPr wrap="none" lIns="0" tIns="0" rIns="0" bIns="0" rtlCol="0">
+                <a:spAutoFit/>
+              </a:bodyPr>
+              <a:lstStyle/>
+              <a:p>
+                <a:pPr/>
+                <a14:m>
+                  <m:oMathPara xmlns:m="http://schemas.openxmlformats.org/officeDocument/2006/math">
+                    <m:oMathParaPr>
+                      <m:jc m:val="centerGroup"/>
+                    </m:oMathParaPr>
+                    <m:oMath xmlns:m="http://schemas.openxmlformats.org/officeDocument/2006/math">
+                      <m:r>
+                        <a:rPr lang="en-US" i="1" smtClean="0">
+                          <a:solidFill>
+                            <a:schemeClr val="bg1"/>
+                          </a:solidFill>
+                          <a:latin typeface="Cambria Math" panose="02040503050406030204" pitchFamily="18" charset="0"/>
+                          <a:ea typeface="Cambria Math" panose="02040503050406030204" pitchFamily="18" charset="0"/>
+                        </a:rPr>
+                        <m:t>𝜃</m:t>
+                      </m:r>
+                    </m:oMath>
+                  </m:oMathPara>
+                </a14:m>
+                <a:endParaRPr lang="en-US" dirty="0"/>
+              </a:p>
+            </p:txBody>
+          </p:sp>
+        </mc:Choice>
+        <mc:Fallback xmlns="">
+          <p:sp>
+            <p:nvSpPr>
+              <p:cNvPr id="39" name="TextBox 38">
+                <a:extLst>
+                  <a:ext uri="{FF2B5EF4-FFF2-40B4-BE49-F238E27FC236}">
+                    <a16:creationId xmlns:a16="http://schemas.microsoft.com/office/drawing/2014/main" id="{3FC96503-2339-44C3-BA2C-E6A23020810A}"/>
+                  </a:ext>
+                </a:extLst>
+              </p:cNvPr>
+              <p:cNvSpPr txBox="1">
+                <a:spLocks noRot="1" noChangeAspect="1" noMove="1" noResize="1" noEditPoints="1" noAdjustHandles="1" noChangeArrowheads="1" noChangeShapeType="1" noTextEdit="1"/>
+              </p:cNvSpPr>
+              <p:nvPr/>
+            </p:nvSpPr>
+            <p:spPr>
+              <a:xfrm>
+                <a:off x="8362026" y="2175222"/>
+                <a:ext cx="189475" cy="276999"/>
+              </a:xfrm>
+              <a:prstGeom prst="rect">
+                <a:avLst/>
+              </a:prstGeom>
+              <a:blipFill>
+                <a:blip r:embed="rId4"/>
+                <a:stretch>
+                  <a:fillRect l="-32258" r="-22581" b="-6667"/>
+                </a:stretch>
+              </a:blipFill>
+            </p:spPr>
+            <p:txBody>
+              <a:bodyPr/>
+              <a:lstStyle/>
+              <a:p>
+                <a:r>
+                  <a:rPr lang="en-US">
+                    <a:noFill/>
+                  </a:rPr>
+                  <a:t> </a:t>
+                </a:r>
+              </a:p>
+            </p:txBody>
+          </p:sp>
+        </mc:Fallback>
+      </mc:AlternateContent>
+      <p:sp>
+        <p:nvSpPr>
+          <p:cNvPr id="40" name="Arc 39">
+            <a:extLst>
+              <a:ext uri="{FF2B5EF4-FFF2-40B4-BE49-F238E27FC236}">
+                <a16:creationId xmlns:a16="http://schemas.microsoft.com/office/drawing/2014/main" id="{54EBD810-AC42-482F-90B9-71D06C6E83AD}"/>
+              </a:ext>
+            </a:extLst>
+          </p:cNvPr>
+          <p:cNvSpPr>
+            <a:spLocks noChangeAspect="1"/>
+          </p:cNvSpPr>
+          <p:nvPr/>
+        </p:nvSpPr>
+        <p:spPr>
+          <a:xfrm>
+            <a:off x="4467568" y="2986812"/>
+            <a:ext cx="2286000" cy="2286000"/>
+          </a:xfrm>
+          <a:prstGeom prst="arc">
+            <a:avLst>
+              <a:gd name="adj1" fmla="val 20507154"/>
+              <a:gd name="adj2" fmla="val 21524870"/>
+            </a:avLst>
+          </a:prstGeom>
+        </p:spPr>
+        <p:style>
+          <a:lnRef idx="1">
+            <a:schemeClr val="accent1"/>
+          </a:lnRef>
+          <a:fillRef idx="0">
+            <a:schemeClr val="accent1"/>
+          </a:fillRef>
+          <a:effectRef idx="0">
+            <a:schemeClr val="accent1"/>
+          </a:effectRef>
+          <a:fontRef idx="minor">
+            <a:schemeClr val="tx1"/>
+          </a:fontRef>
+        </p:style>
+        <p:txBody>
+          <a:bodyPr rtlCol="0" anchor="ctr"/>
+          <a:lstStyle/>
+          <a:p>
+            <a:pPr algn="ctr"/>
+            <a:endParaRPr lang="en-US"/>
+          </a:p>
+        </p:txBody>
+      </p:sp>
+      <mc:AlternateContent xmlns:mc="http://schemas.openxmlformats.org/markup-compatibility/2006" xmlns:a14="http://schemas.microsoft.com/office/drawing/2010/main">
+        <mc:Choice Requires="a14">
+          <p:sp>
+            <p:nvSpPr>
+              <p:cNvPr id="42" name="TextBox 41">
+                <a:extLst>
+                  <a:ext uri="{FF2B5EF4-FFF2-40B4-BE49-F238E27FC236}">
+                    <a16:creationId xmlns:a16="http://schemas.microsoft.com/office/drawing/2014/main" id="{43AF776A-CCEF-4DA6-96CF-649A1BAE8F95}"/>
+                  </a:ext>
+                </a:extLst>
+              </p:cNvPr>
+              <p:cNvSpPr txBox="1"/>
+              <p:nvPr/>
+            </p:nvSpPr>
+            <p:spPr>
+              <a:xfrm>
+                <a:off x="6747735" y="3766328"/>
+                <a:ext cx="214931" cy="276999"/>
+              </a:xfrm>
+              <a:prstGeom prst="rect">
+                <a:avLst/>
+              </a:prstGeom>
+              <a:noFill/>
+            </p:spPr>
+            <p:txBody>
+              <a:bodyPr wrap="none" lIns="0" tIns="0" rIns="0" bIns="0" rtlCol="0">
+                <a:spAutoFit/>
+              </a:bodyPr>
+              <a:lstStyle/>
+              <a:p>
+                <a:pPr/>
+                <a14:m>
+                  <m:oMathPara xmlns:m="http://schemas.openxmlformats.org/officeDocument/2006/math">
+                    <m:oMathParaPr>
+                      <m:jc m:val="centerGroup"/>
+                    </m:oMathParaPr>
+                    <m:oMath xmlns:m="http://schemas.openxmlformats.org/officeDocument/2006/math">
+                      <m:r>
+                        <a:rPr lang="en-US" i="1" smtClean="0">
+                          <a:solidFill>
+                            <a:schemeClr val="bg1"/>
+                          </a:solidFill>
+                          <a:latin typeface="Cambria Math" panose="02040503050406030204" pitchFamily="18" charset="0"/>
+                          <a:ea typeface="Cambria Math" panose="02040503050406030204" pitchFamily="18" charset="0"/>
+                        </a:rPr>
+                        <m:t>𝜑</m:t>
+                      </m:r>
+                    </m:oMath>
+                  </m:oMathPara>
+                </a14:m>
+                <a:endParaRPr lang="en-US" dirty="0"/>
+              </a:p>
+            </p:txBody>
+          </p:sp>
+        </mc:Choice>
+        <mc:Fallback xmlns="">
+          <p:sp>
+            <p:nvSpPr>
+              <p:cNvPr id="42" name="TextBox 41">
+                <a:extLst>
+                  <a:ext uri="{FF2B5EF4-FFF2-40B4-BE49-F238E27FC236}">
+                    <a16:creationId xmlns:a16="http://schemas.microsoft.com/office/drawing/2014/main" id="{43AF776A-CCEF-4DA6-96CF-649A1BAE8F95}"/>
+                  </a:ext>
+                </a:extLst>
+              </p:cNvPr>
+              <p:cNvSpPr txBox="1">
+                <a:spLocks noRot="1" noChangeAspect="1" noMove="1" noResize="1" noEditPoints="1" noAdjustHandles="1" noChangeArrowheads="1" noChangeShapeType="1" noTextEdit="1"/>
+              </p:cNvSpPr>
+              <p:nvPr/>
+            </p:nvSpPr>
+            <p:spPr>
+              <a:xfrm>
+                <a:off x="6747735" y="3766328"/>
+                <a:ext cx="214931" cy="276999"/>
+              </a:xfrm>
+              <a:prstGeom prst="rect">
+                <a:avLst/>
+              </a:prstGeom>
+              <a:blipFill>
+                <a:blip r:embed="rId5"/>
+                <a:stretch>
+                  <a:fillRect l="-28571" r="-25714" b="-26667"/>
+                </a:stretch>
+              </a:blipFill>
+            </p:spPr>
+            <p:txBody>
+              <a:bodyPr/>
+              <a:lstStyle/>
+              <a:p>
+                <a:r>
+                  <a:rPr lang="en-US">
+                    <a:noFill/>
+                  </a:rPr>
+                  <a:t> </a:t>
+                </a:r>
+              </a:p>
+            </p:txBody>
+          </p:sp>
+        </mc:Fallback>
+      </mc:AlternateContent>
+      <mc:AlternateContent xmlns:mc="http://schemas.openxmlformats.org/markup-compatibility/2006" xmlns:a14="http://schemas.microsoft.com/office/drawing/2010/main">
+        <mc:Choice Requires="a14">
+          <p:sp>
+            <p:nvSpPr>
+              <p:cNvPr id="43" name="TextBox 42">
+                <a:extLst>
+                  <a:ext uri="{FF2B5EF4-FFF2-40B4-BE49-F238E27FC236}">
+                    <a16:creationId xmlns:a16="http://schemas.microsoft.com/office/drawing/2014/main" id="{A1A80FEE-5A6A-4857-9A6E-B25D59F66D53}"/>
+                  </a:ext>
+                </a:extLst>
+              </p:cNvPr>
+              <p:cNvSpPr txBox="1"/>
+              <p:nvPr/>
+            </p:nvSpPr>
+            <p:spPr>
+              <a:xfrm>
+                <a:off x="434603" y="3304240"/>
+                <a:ext cx="3579698" cy="369332"/>
+              </a:xfrm>
+              <a:prstGeom prst="rect">
+                <a:avLst/>
+              </a:prstGeom>
+              <a:noFill/>
+            </p:spPr>
+            <p:txBody>
+              <a:bodyPr wrap="none" rtlCol="0">
+                <a:spAutoFit/>
+              </a:bodyPr>
+              <a:lstStyle/>
+              <a:p>
+                <a:pPr/>
+                <a14:m>
+                  <m:oMathPara xmlns:m="http://schemas.openxmlformats.org/officeDocument/2006/math">
+                    <m:oMathParaPr>
+                      <m:jc m:val="centerGroup"/>
+                    </m:oMathParaPr>
+                    <m:oMath xmlns:m="http://schemas.openxmlformats.org/officeDocument/2006/math">
+                      <m:sSub>
+                        <m:sSubPr>
+                          <m:ctrlPr>
+                            <a:rPr lang="en-US" b="0" i="1" smtClean="0">
+                              <a:solidFill>
+                                <a:schemeClr val="bg1"/>
+                              </a:solidFill>
+                              <a:latin typeface="Cambria Math" panose="02040503050406030204" pitchFamily="18" charset="0"/>
+                            </a:rPr>
+                          </m:ctrlPr>
+                        </m:sSubPr>
+                        <m:e>
+                          <m:r>
+                            <a:rPr lang="en-US" b="0" i="1" smtClean="0">
+                              <a:solidFill>
+                                <a:schemeClr val="bg1"/>
+                              </a:solidFill>
+                              <a:latin typeface="Cambria Math" panose="02040503050406030204" pitchFamily="18" charset="0"/>
+                            </a:rPr>
+                            <m:t>𝑥</m:t>
+                          </m:r>
+                        </m:e>
+                        <m:sub>
+                          <m:r>
+                            <a:rPr lang="en-US" b="0" i="1" smtClean="0">
+                              <a:solidFill>
+                                <a:schemeClr val="bg1"/>
+                              </a:solidFill>
+                              <a:latin typeface="Cambria Math" panose="02040503050406030204" pitchFamily="18" charset="0"/>
+                            </a:rPr>
+                            <m:t>0</m:t>
+                          </m:r>
+                        </m:sub>
+                      </m:sSub>
+                      <m:r>
+                        <a:rPr lang="en-US" b="0" i="1" smtClean="0">
+                          <a:solidFill>
+                            <a:schemeClr val="bg1"/>
+                          </a:solidFill>
+                          <a:latin typeface="Cambria Math" panose="02040503050406030204" pitchFamily="18" charset="0"/>
+                        </a:rPr>
+                        <m:t>+</m:t>
+                      </m:r>
+                      <m:sSub>
+                        <m:sSubPr>
+                          <m:ctrlPr>
+                            <a:rPr lang="en-US" b="0" i="1" smtClean="0">
+                              <a:solidFill>
+                                <a:schemeClr val="bg1"/>
+                              </a:solidFill>
+                              <a:latin typeface="Cambria Math" panose="02040503050406030204" pitchFamily="18" charset="0"/>
+                            </a:rPr>
+                          </m:ctrlPr>
+                        </m:sSubPr>
+                        <m:e>
+                          <m:r>
+                            <a:rPr lang="en-US" b="0" i="1" smtClean="0">
+                              <a:solidFill>
+                                <a:schemeClr val="bg1"/>
+                              </a:solidFill>
+                              <a:latin typeface="Cambria Math" panose="02040503050406030204" pitchFamily="18" charset="0"/>
+                            </a:rPr>
+                            <m:t>𝑣</m:t>
+                          </m:r>
+                        </m:e>
+                        <m:sub>
+                          <m:r>
+                            <a:rPr lang="en-US" b="0" i="1" smtClean="0">
+                              <a:solidFill>
+                                <a:schemeClr val="bg1"/>
+                              </a:solidFill>
+                              <a:latin typeface="Cambria Math" panose="02040503050406030204" pitchFamily="18" charset="0"/>
+                            </a:rPr>
+                            <m:t>𝑎𝑠𝑡</m:t>
+                          </m:r>
+                        </m:sub>
+                      </m:sSub>
+                      <m:r>
+                        <a:rPr lang="en-US" b="0" i="1" smtClean="0">
+                          <a:solidFill>
+                            <a:schemeClr val="bg1"/>
+                          </a:solidFill>
+                          <a:latin typeface="Cambria Math" panose="02040503050406030204" pitchFamily="18" charset="0"/>
+                        </a:rPr>
+                        <m:t> </m:t>
+                      </m:r>
+                      <m:r>
+                        <a:rPr lang="en-US" b="0" i="1" smtClean="0">
+                          <a:solidFill>
+                            <a:schemeClr val="bg1"/>
+                          </a:solidFill>
+                          <a:latin typeface="Cambria Math" panose="02040503050406030204" pitchFamily="18" charset="0"/>
+                        </a:rPr>
+                        <m:t>𝑡</m:t>
+                      </m:r>
+                      <m:r>
+                        <a:rPr lang="en-US" b="0" i="1" smtClean="0">
+                          <a:solidFill>
+                            <a:schemeClr val="bg1"/>
+                          </a:solidFill>
+                          <a:latin typeface="Cambria Math" panose="02040503050406030204" pitchFamily="18" charset="0"/>
+                        </a:rPr>
+                        <m:t> </m:t>
+                      </m:r>
+                      <m:r>
+                        <m:rPr>
+                          <m:sty m:val="p"/>
+                        </m:rPr>
+                        <a:rPr lang="en-US" b="0" i="0" smtClean="0">
+                          <a:solidFill>
+                            <a:schemeClr val="bg1"/>
+                          </a:solidFill>
+                          <a:latin typeface="Cambria Math" panose="02040503050406030204" pitchFamily="18" charset="0"/>
+                        </a:rPr>
+                        <m:t>cos</m:t>
+                      </m:r>
+                      <m:d>
+                        <m:dPr>
+                          <m:ctrlPr>
+                            <a:rPr lang="en-US" b="0" i="1" smtClean="0">
+                              <a:solidFill>
+                                <a:schemeClr val="bg1"/>
+                              </a:solidFill>
+                              <a:latin typeface="Cambria Math" panose="02040503050406030204" pitchFamily="18" charset="0"/>
+                            </a:rPr>
+                          </m:ctrlPr>
+                        </m:dPr>
+                        <m:e>
+                          <m:r>
+                            <m:rPr>
+                              <m:sty m:val="p"/>
+                            </m:rPr>
+                            <a:rPr lang="el-GR" b="0" i="1" smtClean="0">
+                              <a:solidFill>
+                                <a:schemeClr val="bg1"/>
+                              </a:solidFill>
+                              <a:latin typeface="Cambria Math" panose="02040503050406030204" pitchFamily="18" charset="0"/>
+                              <a:ea typeface="Cambria Math" panose="02040503050406030204" pitchFamily="18" charset="0"/>
+                            </a:rPr>
+                            <m:t>θ</m:t>
+                          </m:r>
+                        </m:e>
+                      </m:d>
+                      <m:r>
+                        <a:rPr lang="en-US" b="0" i="1" smtClean="0">
+                          <a:solidFill>
+                            <a:schemeClr val="bg1"/>
+                          </a:solidFill>
+                          <a:latin typeface="Cambria Math" panose="02040503050406030204" pitchFamily="18" charset="0"/>
+                          <a:ea typeface="Cambria Math" panose="02040503050406030204" pitchFamily="18" charset="0"/>
+                        </a:rPr>
+                        <m:t>= </m:t>
+                      </m:r>
+                      <m:sSub>
+                        <m:sSubPr>
+                          <m:ctrlPr>
+                            <a:rPr lang="en-US" b="0" i="1" smtClean="0">
+                              <a:solidFill>
+                                <a:schemeClr val="bg1"/>
+                              </a:solidFill>
+                              <a:latin typeface="Cambria Math" panose="02040503050406030204" pitchFamily="18" charset="0"/>
+                              <a:ea typeface="Cambria Math" panose="02040503050406030204" pitchFamily="18" charset="0"/>
+                            </a:rPr>
+                          </m:ctrlPr>
+                        </m:sSubPr>
+                        <m:e>
+                          <m:r>
+                            <a:rPr lang="en-US" b="0" i="1" smtClean="0">
+                              <a:solidFill>
+                                <a:schemeClr val="bg1"/>
+                              </a:solidFill>
+                              <a:latin typeface="Cambria Math" panose="02040503050406030204" pitchFamily="18" charset="0"/>
+                              <a:ea typeface="Cambria Math" panose="02040503050406030204" pitchFamily="18" charset="0"/>
+                            </a:rPr>
+                            <m:t>𝑣</m:t>
+                          </m:r>
+                        </m:e>
+                        <m:sub>
+                          <m:r>
+                            <a:rPr lang="en-US" b="0" i="1" smtClean="0">
+                              <a:solidFill>
+                                <a:schemeClr val="bg1"/>
+                              </a:solidFill>
+                              <a:latin typeface="Cambria Math" panose="02040503050406030204" pitchFamily="18" charset="0"/>
+                              <a:ea typeface="Cambria Math" panose="02040503050406030204" pitchFamily="18" charset="0"/>
+                            </a:rPr>
+                            <m:t>𝑏𝑙𝑡</m:t>
+                          </m:r>
+                        </m:sub>
+                      </m:sSub>
+                      <m:r>
+                        <a:rPr lang="en-US" b="0" i="1" smtClean="0">
+                          <a:solidFill>
+                            <a:schemeClr val="bg1"/>
+                          </a:solidFill>
+                          <a:latin typeface="Cambria Math" panose="02040503050406030204" pitchFamily="18" charset="0"/>
+                          <a:ea typeface="Cambria Math" panose="02040503050406030204" pitchFamily="18" charset="0"/>
+                        </a:rPr>
+                        <m:t> </m:t>
+                      </m:r>
+                      <m:r>
+                        <a:rPr lang="en-US" b="0" i="1" smtClean="0">
+                          <a:solidFill>
+                            <a:schemeClr val="bg1"/>
+                          </a:solidFill>
+                          <a:latin typeface="Cambria Math" panose="02040503050406030204" pitchFamily="18" charset="0"/>
+                          <a:ea typeface="Cambria Math" panose="02040503050406030204" pitchFamily="18" charset="0"/>
+                        </a:rPr>
+                        <m:t>𝑡</m:t>
+                      </m:r>
+                      <m:r>
+                        <a:rPr lang="en-US" b="0" i="1" smtClean="0">
+                          <a:solidFill>
+                            <a:schemeClr val="bg1"/>
+                          </a:solidFill>
+                          <a:latin typeface="Cambria Math" panose="02040503050406030204" pitchFamily="18" charset="0"/>
+                          <a:ea typeface="Cambria Math" panose="02040503050406030204" pitchFamily="18" charset="0"/>
+                        </a:rPr>
+                        <m:t> </m:t>
+                      </m:r>
+                      <m:r>
+                        <m:rPr>
+                          <m:sty m:val="p"/>
+                        </m:rPr>
+                        <a:rPr lang="en-US" b="0" i="0" smtClean="0">
+                          <a:solidFill>
+                            <a:schemeClr val="bg1"/>
+                          </a:solidFill>
+                          <a:latin typeface="Cambria Math" panose="02040503050406030204" pitchFamily="18" charset="0"/>
+                          <a:ea typeface="Cambria Math" panose="02040503050406030204" pitchFamily="18" charset="0"/>
+                        </a:rPr>
+                        <m:t>cos</m:t>
+                      </m:r>
+                      <m:r>
+                        <a:rPr lang="en-US" b="0" i="1" smtClean="0">
+                          <a:solidFill>
+                            <a:schemeClr val="bg1"/>
+                          </a:solidFill>
+                          <a:latin typeface="Cambria Math" panose="02040503050406030204" pitchFamily="18" charset="0"/>
+                          <a:ea typeface="Cambria Math" panose="02040503050406030204" pitchFamily="18" charset="0"/>
+                        </a:rPr>
+                        <m:t>(</m:t>
+                      </m:r>
+                      <m:r>
+                        <a:rPr lang="en-US" b="0" i="1" smtClean="0">
+                          <a:solidFill>
+                            <a:schemeClr val="bg1"/>
+                          </a:solidFill>
+                          <a:latin typeface="Cambria Math" panose="02040503050406030204" pitchFamily="18" charset="0"/>
+                          <a:ea typeface="Cambria Math" panose="02040503050406030204" pitchFamily="18" charset="0"/>
+                        </a:rPr>
+                        <m:t>𝜑</m:t>
+                      </m:r>
+                      <m:r>
+                        <a:rPr lang="en-US" b="0" i="1" smtClean="0">
+                          <a:solidFill>
+                            <a:schemeClr val="bg1"/>
+                          </a:solidFill>
+                          <a:latin typeface="Cambria Math" panose="02040503050406030204" pitchFamily="18" charset="0"/>
+                          <a:ea typeface="Cambria Math" panose="02040503050406030204" pitchFamily="18" charset="0"/>
+                        </a:rPr>
+                        <m:t>)</m:t>
+                      </m:r>
+                    </m:oMath>
+                  </m:oMathPara>
+                </a14:m>
+                <a:endParaRPr lang="en-US" dirty="0"/>
+              </a:p>
+            </p:txBody>
+          </p:sp>
+        </mc:Choice>
+        <mc:Fallback xmlns="">
+          <p:sp>
+            <p:nvSpPr>
+              <p:cNvPr id="43" name="TextBox 42">
+                <a:extLst>
+                  <a:ext uri="{FF2B5EF4-FFF2-40B4-BE49-F238E27FC236}">
+                    <a16:creationId xmlns:a16="http://schemas.microsoft.com/office/drawing/2014/main" id="{A1A80FEE-5A6A-4857-9A6E-B25D59F66D53}"/>
+                  </a:ext>
+                </a:extLst>
+              </p:cNvPr>
+              <p:cNvSpPr txBox="1">
+                <a:spLocks noRot="1" noChangeAspect="1" noMove="1" noResize="1" noEditPoints="1" noAdjustHandles="1" noChangeArrowheads="1" noChangeShapeType="1" noTextEdit="1"/>
+              </p:cNvSpPr>
+              <p:nvPr/>
+            </p:nvSpPr>
+            <p:spPr>
+              <a:xfrm>
+                <a:off x="434603" y="3304240"/>
+                <a:ext cx="3579698" cy="369332"/>
+              </a:xfrm>
+              <a:prstGeom prst="rect">
+                <a:avLst/>
+              </a:prstGeom>
+              <a:blipFill>
+                <a:blip r:embed="rId6"/>
+                <a:stretch>
+                  <a:fillRect b="-13115"/>
+                </a:stretch>
+              </a:blipFill>
+            </p:spPr>
+            <p:txBody>
+              <a:bodyPr/>
+              <a:lstStyle/>
+              <a:p>
+                <a:r>
+                  <a:rPr lang="en-US">
+                    <a:noFill/>
+                  </a:rPr>
+                  <a:t> </a:t>
+                </a:r>
+              </a:p>
+            </p:txBody>
+          </p:sp>
+        </mc:Fallback>
+      </mc:AlternateContent>
+      <mc:AlternateContent xmlns:mc="http://schemas.openxmlformats.org/markup-compatibility/2006" xmlns:a14="http://schemas.microsoft.com/office/drawing/2010/main">
+        <mc:Choice Requires="a14">
+          <p:sp>
+            <p:nvSpPr>
+              <p:cNvPr id="44" name="TextBox 43">
+                <a:extLst>
+                  <a:ext uri="{FF2B5EF4-FFF2-40B4-BE49-F238E27FC236}">
+                    <a16:creationId xmlns:a16="http://schemas.microsoft.com/office/drawing/2014/main" id="{211B655B-63C0-422B-B576-9D69B8585B2D}"/>
+                  </a:ext>
+                </a:extLst>
+              </p:cNvPr>
+              <p:cNvSpPr txBox="1"/>
+              <p:nvPr/>
+            </p:nvSpPr>
+            <p:spPr>
+              <a:xfrm>
+                <a:off x="434603" y="3673572"/>
+                <a:ext cx="3520451" cy="369332"/>
+              </a:xfrm>
+              <a:prstGeom prst="rect">
+                <a:avLst/>
+              </a:prstGeom>
+              <a:noFill/>
+            </p:spPr>
+            <p:txBody>
+              <a:bodyPr wrap="none" rtlCol="0">
+                <a:spAutoFit/>
+              </a:bodyPr>
+              <a:lstStyle/>
+              <a:p>
+                <a:pPr/>
+                <a14:m>
+                  <m:oMathPara xmlns:m="http://schemas.openxmlformats.org/officeDocument/2006/math">
+                    <m:oMathParaPr>
+                      <m:jc m:val="centerGroup"/>
+                    </m:oMathParaPr>
+                    <m:oMath xmlns:m="http://schemas.openxmlformats.org/officeDocument/2006/math">
+                      <m:sSub>
+                        <m:sSubPr>
+                          <m:ctrlPr>
+                            <a:rPr lang="en-US" b="0" i="1" smtClean="0">
+                              <a:solidFill>
+                                <a:schemeClr val="bg1"/>
+                              </a:solidFill>
+                              <a:latin typeface="Cambria Math" panose="02040503050406030204" pitchFamily="18" charset="0"/>
+                            </a:rPr>
+                          </m:ctrlPr>
+                        </m:sSubPr>
+                        <m:e>
+                          <m:r>
+                            <a:rPr lang="en-US" b="0" i="1" smtClean="0">
+                              <a:solidFill>
+                                <a:schemeClr val="bg1"/>
+                              </a:solidFill>
+                              <a:latin typeface="Cambria Math" panose="02040503050406030204" pitchFamily="18" charset="0"/>
+                            </a:rPr>
+                            <m:t>𝑦</m:t>
+                          </m:r>
+                        </m:e>
+                        <m:sub>
+                          <m:r>
+                            <a:rPr lang="en-US" b="0" i="1" smtClean="0">
+                              <a:solidFill>
+                                <a:schemeClr val="bg1"/>
+                              </a:solidFill>
+                              <a:latin typeface="Cambria Math" panose="02040503050406030204" pitchFamily="18" charset="0"/>
+                            </a:rPr>
+                            <m:t>0</m:t>
+                          </m:r>
+                        </m:sub>
+                      </m:sSub>
+                      <m:r>
+                        <a:rPr lang="en-US" b="0" i="1" smtClean="0">
+                          <a:solidFill>
+                            <a:schemeClr val="bg1"/>
+                          </a:solidFill>
+                          <a:latin typeface="Cambria Math" panose="02040503050406030204" pitchFamily="18" charset="0"/>
+                        </a:rPr>
+                        <m:t>+</m:t>
+                      </m:r>
+                      <m:sSub>
+                        <m:sSubPr>
+                          <m:ctrlPr>
+                            <a:rPr lang="en-US" b="0" i="1" smtClean="0">
+                              <a:solidFill>
+                                <a:schemeClr val="bg1"/>
+                              </a:solidFill>
+                              <a:latin typeface="Cambria Math" panose="02040503050406030204" pitchFamily="18" charset="0"/>
+                            </a:rPr>
+                          </m:ctrlPr>
+                        </m:sSubPr>
+                        <m:e>
+                          <m:r>
+                            <a:rPr lang="en-US" b="0" i="1" smtClean="0">
+                              <a:solidFill>
+                                <a:schemeClr val="bg1"/>
+                              </a:solidFill>
+                              <a:latin typeface="Cambria Math" panose="02040503050406030204" pitchFamily="18" charset="0"/>
+                            </a:rPr>
+                            <m:t>𝑣</m:t>
+                          </m:r>
+                        </m:e>
+                        <m:sub>
+                          <m:r>
+                            <a:rPr lang="en-US" b="0" i="1" smtClean="0">
+                              <a:solidFill>
+                                <a:schemeClr val="bg1"/>
+                              </a:solidFill>
+                              <a:latin typeface="Cambria Math" panose="02040503050406030204" pitchFamily="18" charset="0"/>
+                            </a:rPr>
+                            <m:t>𝑎𝑠𝑡</m:t>
+                          </m:r>
+                        </m:sub>
+                      </m:sSub>
+                      <m:r>
+                        <a:rPr lang="en-US" b="0" i="1" smtClean="0">
+                          <a:solidFill>
+                            <a:schemeClr val="bg1"/>
+                          </a:solidFill>
+                          <a:latin typeface="Cambria Math" panose="02040503050406030204" pitchFamily="18" charset="0"/>
+                        </a:rPr>
+                        <m:t> </m:t>
+                      </m:r>
+                      <m:r>
+                        <a:rPr lang="en-US" b="0" i="1" smtClean="0">
+                          <a:solidFill>
+                            <a:schemeClr val="bg1"/>
+                          </a:solidFill>
+                          <a:latin typeface="Cambria Math" panose="02040503050406030204" pitchFamily="18" charset="0"/>
+                        </a:rPr>
+                        <m:t>𝑡</m:t>
+                      </m:r>
+                      <m:r>
+                        <a:rPr lang="en-US" b="0" i="1" smtClean="0">
+                          <a:solidFill>
+                            <a:schemeClr val="bg1"/>
+                          </a:solidFill>
+                          <a:latin typeface="Cambria Math" panose="02040503050406030204" pitchFamily="18" charset="0"/>
+                        </a:rPr>
+                        <m:t> </m:t>
+                      </m:r>
+                      <m:r>
+                        <m:rPr>
+                          <m:sty m:val="p"/>
+                        </m:rPr>
+                        <a:rPr lang="en-US" b="0" i="0" smtClean="0">
+                          <a:solidFill>
+                            <a:schemeClr val="bg1"/>
+                          </a:solidFill>
+                          <a:latin typeface="Cambria Math" panose="02040503050406030204" pitchFamily="18" charset="0"/>
+                        </a:rPr>
+                        <m:t>sin</m:t>
+                      </m:r>
+                      <m:d>
+                        <m:dPr>
+                          <m:ctrlPr>
+                            <a:rPr lang="en-US" b="0" i="1" smtClean="0">
+                              <a:solidFill>
+                                <a:schemeClr val="bg1"/>
+                              </a:solidFill>
+                              <a:latin typeface="Cambria Math" panose="02040503050406030204" pitchFamily="18" charset="0"/>
+                            </a:rPr>
+                          </m:ctrlPr>
+                        </m:dPr>
+                        <m:e>
+                          <m:r>
+                            <m:rPr>
+                              <m:sty m:val="p"/>
+                            </m:rPr>
+                            <a:rPr lang="el-GR" b="0" i="1" smtClean="0">
+                              <a:solidFill>
+                                <a:schemeClr val="bg1"/>
+                              </a:solidFill>
+                              <a:latin typeface="Cambria Math" panose="02040503050406030204" pitchFamily="18" charset="0"/>
+                              <a:ea typeface="Cambria Math" panose="02040503050406030204" pitchFamily="18" charset="0"/>
+                            </a:rPr>
+                            <m:t>θ</m:t>
+                          </m:r>
+                        </m:e>
+                      </m:d>
+                      <m:r>
+                        <a:rPr lang="en-US" b="0" i="1" smtClean="0">
+                          <a:solidFill>
+                            <a:schemeClr val="bg1"/>
+                          </a:solidFill>
+                          <a:latin typeface="Cambria Math" panose="02040503050406030204" pitchFamily="18" charset="0"/>
+                          <a:ea typeface="Cambria Math" panose="02040503050406030204" pitchFamily="18" charset="0"/>
+                        </a:rPr>
+                        <m:t>= </m:t>
+                      </m:r>
+                      <m:sSub>
+                        <m:sSubPr>
+                          <m:ctrlPr>
+                            <a:rPr lang="en-US" b="0" i="1" smtClean="0">
+                              <a:solidFill>
+                                <a:schemeClr val="bg1"/>
+                              </a:solidFill>
+                              <a:latin typeface="Cambria Math" panose="02040503050406030204" pitchFamily="18" charset="0"/>
+                              <a:ea typeface="Cambria Math" panose="02040503050406030204" pitchFamily="18" charset="0"/>
+                            </a:rPr>
+                          </m:ctrlPr>
+                        </m:sSubPr>
+                        <m:e>
+                          <m:r>
+                            <a:rPr lang="en-US" b="0" i="1" smtClean="0">
+                              <a:solidFill>
+                                <a:schemeClr val="bg1"/>
+                              </a:solidFill>
+                              <a:latin typeface="Cambria Math" panose="02040503050406030204" pitchFamily="18" charset="0"/>
+                              <a:ea typeface="Cambria Math" panose="02040503050406030204" pitchFamily="18" charset="0"/>
+                            </a:rPr>
+                            <m:t>𝑣</m:t>
+                          </m:r>
+                        </m:e>
+                        <m:sub>
+                          <m:r>
+                            <a:rPr lang="en-US" b="0" i="1" smtClean="0">
+                              <a:solidFill>
+                                <a:schemeClr val="bg1"/>
+                              </a:solidFill>
+                              <a:latin typeface="Cambria Math" panose="02040503050406030204" pitchFamily="18" charset="0"/>
+                              <a:ea typeface="Cambria Math" panose="02040503050406030204" pitchFamily="18" charset="0"/>
+                            </a:rPr>
+                            <m:t>𝑏𝑙𝑡</m:t>
+                          </m:r>
+                        </m:sub>
+                      </m:sSub>
+                      <m:r>
+                        <a:rPr lang="en-US" b="0" i="1" smtClean="0">
+                          <a:solidFill>
+                            <a:schemeClr val="bg1"/>
+                          </a:solidFill>
+                          <a:latin typeface="Cambria Math" panose="02040503050406030204" pitchFamily="18" charset="0"/>
+                          <a:ea typeface="Cambria Math" panose="02040503050406030204" pitchFamily="18" charset="0"/>
+                        </a:rPr>
+                        <m:t> </m:t>
+                      </m:r>
+                      <m:r>
+                        <a:rPr lang="en-US" b="0" i="1" smtClean="0">
+                          <a:solidFill>
+                            <a:schemeClr val="bg1"/>
+                          </a:solidFill>
+                          <a:latin typeface="Cambria Math" panose="02040503050406030204" pitchFamily="18" charset="0"/>
+                          <a:ea typeface="Cambria Math" panose="02040503050406030204" pitchFamily="18" charset="0"/>
+                        </a:rPr>
+                        <m:t>𝑡</m:t>
+                      </m:r>
+                      <m:r>
+                        <a:rPr lang="en-US" b="0" i="1" smtClean="0">
+                          <a:solidFill>
+                            <a:schemeClr val="bg1"/>
+                          </a:solidFill>
+                          <a:latin typeface="Cambria Math" panose="02040503050406030204" pitchFamily="18" charset="0"/>
+                          <a:ea typeface="Cambria Math" panose="02040503050406030204" pitchFamily="18" charset="0"/>
+                        </a:rPr>
+                        <m:t> </m:t>
+                      </m:r>
+                      <m:r>
+                        <m:rPr>
+                          <m:sty m:val="p"/>
+                        </m:rPr>
+                        <a:rPr lang="en-US" b="0" i="0" smtClean="0">
+                          <a:solidFill>
+                            <a:schemeClr val="bg1"/>
+                          </a:solidFill>
+                          <a:latin typeface="Cambria Math" panose="02040503050406030204" pitchFamily="18" charset="0"/>
+                          <a:ea typeface="Cambria Math" panose="02040503050406030204" pitchFamily="18" charset="0"/>
+                        </a:rPr>
+                        <m:t>sin</m:t>
+                      </m:r>
+                      <m:r>
+                        <a:rPr lang="en-US" b="0" i="1" smtClean="0">
+                          <a:solidFill>
+                            <a:schemeClr val="bg1"/>
+                          </a:solidFill>
+                          <a:latin typeface="Cambria Math" panose="02040503050406030204" pitchFamily="18" charset="0"/>
+                          <a:ea typeface="Cambria Math" panose="02040503050406030204" pitchFamily="18" charset="0"/>
+                        </a:rPr>
+                        <m:t>(</m:t>
+                      </m:r>
+                      <m:r>
+                        <a:rPr lang="en-US" b="0" i="1" smtClean="0">
+                          <a:solidFill>
+                            <a:schemeClr val="bg1"/>
+                          </a:solidFill>
+                          <a:latin typeface="Cambria Math" panose="02040503050406030204" pitchFamily="18" charset="0"/>
+                          <a:ea typeface="Cambria Math" panose="02040503050406030204" pitchFamily="18" charset="0"/>
+                        </a:rPr>
+                        <m:t>𝜑</m:t>
+                      </m:r>
+                      <m:r>
+                        <a:rPr lang="en-US" b="0" i="1" smtClean="0">
+                          <a:solidFill>
+                            <a:schemeClr val="bg1"/>
+                          </a:solidFill>
+                          <a:latin typeface="Cambria Math" panose="02040503050406030204" pitchFamily="18" charset="0"/>
+                          <a:ea typeface="Cambria Math" panose="02040503050406030204" pitchFamily="18" charset="0"/>
+                        </a:rPr>
+                        <m:t>)</m:t>
+                      </m:r>
+                    </m:oMath>
+                  </m:oMathPara>
+                </a14:m>
+                <a:endParaRPr lang="en-US" dirty="0"/>
+              </a:p>
+            </p:txBody>
+          </p:sp>
+        </mc:Choice>
+        <mc:Fallback xmlns="">
+          <p:sp>
+            <p:nvSpPr>
+              <p:cNvPr id="44" name="TextBox 43">
+                <a:extLst>
+                  <a:ext uri="{FF2B5EF4-FFF2-40B4-BE49-F238E27FC236}">
+                    <a16:creationId xmlns:a16="http://schemas.microsoft.com/office/drawing/2014/main" id="{211B655B-63C0-422B-B576-9D69B8585B2D}"/>
+                  </a:ext>
+                </a:extLst>
+              </p:cNvPr>
+              <p:cNvSpPr txBox="1">
+                <a:spLocks noRot="1" noChangeAspect="1" noMove="1" noResize="1" noEditPoints="1" noAdjustHandles="1" noChangeArrowheads="1" noChangeShapeType="1" noTextEdit="1"/>
+              </p:cNvSpPr>
+              <p:nvPr/>
+            </p:nvSpPr>
+            <p:spPr>
+              <a:xfrm>
+                <a:off x="434603" y="3673572"/>
+                <a:ext cx="3520451" cy="369332"/>
+              </a:xfrm>
+              <a:prstGeom prst="rect">
+                <a:avLst/>
+              </a:prstGeom>
+              <a:blipFill>
+                <a:blip r:embed="rId7"/>
+                <a:stretch>
+                  <a:fillRect b="-13333"/>
+                </a:stretch>
+              </a:blipFill>
+            </p:spPr>
+            <p:txBody>
+              <a:bodyPr/>
+              <a:lstStyle/>
+              <a:p>
+                <a:r>
+                  <a:rPr lang="en-US">
+                    <a:noFill/>
+                  </a:rPr>
+                  <a:t> </a:t>
+                </a:r>
+              </a:p>
+            </p:txBody>
+          </p:sp>
+        </mc:Fallback>
+      </mc:AlternateContent>
+      <mc:AlternateContent xmlns:mc="http://schemas.openxmlformats.org/markup-compatibility/2006">
+        <mc:Choice xmlns:a14="http://schemas.microsoft.com/office/drawing/2010/main" Requires="a14">
+          <p:sp>
+            <p:nvSpPr>
+              <p:cNvPr id="46" name="TextBox 45">
+                <a:extLst>
+                  <a:ext uri="{FF2B5EF4-FFF2-40B4-BE49-F238E27FC236}">
+                    <a16:creationId xmlns:a16="http://schemas.microsoft.com/office/drawing/2014/main" id="{2DE87C8C-160C-4B58-AFE1-B60038A31D9D}"/>
+                  </a:ext>
+                </a:extLst>
+              </p:cNvPr>
+              <p:cNvSpPr txBox="1"/>
+              <p:nvPr/>
+            </p:nvSpPr>
+            <p:spPr>
+              <a:xfrm>
+                <a:off x="97962" y="2704400"/>
+                <a:ext cx="4463338" cy="369332"/>
+              </a:xfrm>
+              <a:prstGeom prst="rect">
+                <a:avLst/>
+              </a:prstGeom>
+              <a:noFill/>
+            </p:spPr>
+            <p:txBody>
+              <a:bodyPr wrap="none" rtlCol="0">
+                <a:spAutoFit/>
+              </a:bodyPr>
+              <a:lstStyle/>
+              <a:p>
+                <a:r>
+                  <a:rPr lang="en-US" dirty="0">
+                    <a:solidFill>
+                      <a:schemeClr val="bg1"/>
+                    </a:solidFill>
+                  </a:rPr>
+                  <a:t>Need To Solve This System of Equations for </a:t>
+                </a:r>
+                <a14:m>
+                  <m:oMath xmlns:m="http://schemas.openxmlformats.org/officeDocument/2006/math">
+                    <m:r>
+                      <a:rPr lang="en-US" b="0" i="1" smtClean="0">
+                        <a:solidFill>
+                          <a:schemeClr val="bg1"/>
+                        </a:solidFill>
+                        <a:latin typeface="Cambria Math" panose="02040503050406030204" pitchFamily="18" charset="0"/>
+                        <a:ea typeface="Cambria Math" panose="02040503050406030204" pitchFamily="18" charset="0"/>
+                      </a:rPr>
+                      <m:t>𝜑</m:t>
+                    </m:r>
+                  </m:oMath>
+                </a14:m>
+                <a:r>
+                  <a:rPr lang="en-US" dirty="0">
+                    <a:solidFill>
+                      <a:schemeClr val="bg1"/>
+                    </a:solidFill>
+                  </a:rPr>
+                  <a:t> </a:t>
+                </a:r>
+              </a:p>
+            </p:txBody>
+          </p:sp>
+        </mc:Choice>
+        <mc:Fallback>
+          <p:sp>
+            <p:nvSpPr>
+              <p:cNvPr id="46" name="TextBox 45">
+                <a:extLst>
+                  <a:ext uri="{FF2B5EF4-FFF2-40B4-BE49-F238E27FC236}">
+                    <a16:creationId xmlns:a16="http://schemas.microsoft.com/office/drawing/2014/main" id="{2DE87C8C-160C-4B58-AFE1-B60038A31D9D}"/>
+                  </a:ext>
+                </a:extLst>
+              </p:cNvPr>
+              <p:cNvSpPr txBox="1">
+                <a:spLocks noRot="1" noChangeAspect="1" noMove="1" noResize="1" noEditPoints="1" noAdjustHandles="1" noChangeArrowheads="1" noChangeShapeType="1" noTextEdit="1"/>
+              </p:cNvSpPr>
+              <p:nvPr/>
+            </p:nvSpPr>
+            <p:spPr>
+              <a:xfrm>
+                <a:off x="97962" y="2704400"/>
+                <a:ext cx="4463338" cy="369332"/>
+              </a:xfrm>
+              <a:prstGeom prst="rect">
+                <a:avLst/>
+              </a:prstGeom>
+              <a:blipFill>
+                <a:blip r:embed="rId8"/>
+                <a:stretch>
+                  <a:fillRect l="-1093" t="-10000" b="-26667"/>
+                </a:stretch>
+              </a:blipFill>
+            </p:spPr>
+            <p:txBody>
+              <a:bodyPr/>
+              <a:lstStyle/>
+              <a:p>
+                <a:r>
+                  <a:rPr lang="en-US">
+                    <a:noFill/>
+                  </a:rPr>
+                  <a:t> </a:t>
+                </a:r>
+              </a:p>
+            </p:txBody>
+          </p:sp>
+        </mc:Fallback>
+      </mc:AlternateContent>
+      <p:cxnSp>
+        <p:nvCxnSpPr>
+          <p:cNvPr id="47" name="Straight Connector 46">
+            <a:extLst>
+              <a:ext uri="{FF2B5EF4-FFF2-40B4-BE49-F238E27FC236}">
+                <a16:creationId xmlns:a16="http://schemas.microsoft.com/office/drawing/2014/main" id="{4D9F5969-34B9-4573-B22B-B6861908F474}"/>
+              </a:ext>
+            </a:extLst>
+          </p:cNvPr>
+          <p:cNvCxnSpPr>
+            <a:cxnSpLocks/>
+          </p:cNvCxnSpPr>
+          <p:nvPr/>
+        </p:nvCxnSpPr>
+        <p:spPr>
+          <a:xfrm>
+            <a:off x="7762760" y="2080897"/>
+            <a:ext cx="2077579" cy="16247"/>
+          </a:xfrm>
+          <a:prstGeom prst="line">
+            <a:avLst/>
+          </a:prstGeom>
+          <a:ln>
+            <a:solidFill>
+              <a:schemeClr val="bg1"/>
+            </a:solidFill>
+            <a:prstDash val="dash"/>
+          </a:ln>
+        </p:spPr>
+        <p:style>
+          <a:lnRef idx="1">
+            <a:schemeClr val="accent1"/>
+          </a:lnRef>
+          <a:fillRef idx="0">
+            <a:schemeClr val="accent1"/>
+          </a:fillRef>
+          <a:effectRef idx="0">
+            <a:schemeClr val="accent1"/>
+          </a:effectRef>
+          <a:fontRef idx="minor">
+            <a:schemeClr val="tx1"/>
+          </a:fontRef>
+        </p:style>
+      </p:cxnSp>
+    </p:spTree>
+    <p:extLst>
+      <p:ext uri="{BB962C8B-B14F-4D97-AF65-F5344CB8AC3E}">
+        <p14:creationId xmlns:p14="http://schemas.microsoft.com/office/powerpoint/2010/main" val="3805423029"/>
+      </p:ext>
+    </p:extLst>
+  </p:cSld>
+  <p:clrMapOvr>
+    <a:masterClrMapping/>
+  </p:clrMapOvr>
+</p:sld>
+</file>
+
+<file path=ppt/slides/slide8.xml><?xml version="1.0" encoding="utf-8"?>
+<p:sld xmlns:a="http://schemas.openxmlformats.org/drawingml/2006/main" xmlns:r="http://schemas.openxmlformats.org/officeDocument/2006/relationships" xmlns:p="http://schemas.openxmlformats.org/presentationml/2006/main">
+  <p:cSld>
+    <p:bg>
+      <p:bgPr>
+        <a:solidFill>
+          <a:schemeClr val="tx1"/>
+        </a:solidFill>
+        <a:effectLst/>
+      </p:bgPr>
+    </p:bg>
+    <p:spTree>
+      <p:nvGrpSpPr>
+        <p:cNvPr id="1" name=""/>
+        <p:cNvGrpSpPr/>
+        <p:nvPr/>
+      </p:nvGrpSpPr>
+      <p:grpSpPr>
+        <a:xfrm>
+          <a:off x="0" y="0"/>
+          <a:ext cx="0" cy="0"/>
+          <a:chOff x="0" y="0"/>
+          <a:chExt cx="0" cy="0"/>
+        </a:xfrm>
+      </p:grpSpPr>
+      <p:sp>
+        <p:nvSpPr>
+          <p:cNvPr id="3" name="Isosceles Triangle 2">
+            <a:extLst>
+              <a:ext uri="{FF2B5EF4-FFF2-40B4-BE49-F238E27FC236}">
+                <a16:creationId xmlns:a16="http://schemas.microsoft.com/office/drawing/2014/main" id="{DA7622A9-817A-4D51-919E-415116300416}"/>
+              </a:ext>
+            </a:extLst>
+          </p:cNvPr>
+          <p:cNvSpPr/>
+          <p:nvPr/>
+        </p:nvSpPr>
+        <p:spPr>
+          <a:xfrm rot="2603727">
+            <a:off x="5623832" y="3913414"/>
+            <a:ext cx="233265" cy="326572"/>
+          </a:xfrm>
+          <a:prstGeom prst="triangle">
+            <a:avLst/>
+          </a:prstGeom>
+          <a:solidFill>
+            <a:schemeClr val="bg1"/>
+          </a:solidFill>
+          <a:ln>
+            <a:solidFill>
+              <a:schemeClr val="bg1"/>
+            </a:solidFill>
+          </a:ln>
+        </p:spPr>
+        <p:style>
+          <a:lnRef idx="2">
+            <a:schemeClr val="accent1">
+              <a:shade val="50000"/>
+            </a:schemeClr>
+          </a:lnRef>
+          <a:fillRef idx="1">
+            <a:schemeClr val="accent1"/>
+          </a:fillRef>
+          <a:effectRef idx="0">
+            <a:schemeClr val="accent1"/>
+          </a:effectRef>
+          <a:fontRef idx="minor">
+            <a:schemeClr val="lt1"/>
+          </a:fontRef>
+        </p:style>
+        <p:txBody>
+          <a:bodyPr rtlCol="0" anchor="ctr"/>
+          <a:lstStyle/>
+          <a:p>
+            <a:pPr algn="ctr"/>
+            <a:endParaRPr lang="en-US"/>
+          </a:p>
+        </p:txBody>
+      </p:sp>
+      <p:sp>
+        <p:nvSpPr>
+          <p:cNvPr id="5" name="Oval 4">
+            <a:extLst>
+              <a:ext uri="{FF2B5EF4-FFF2-40B4-BE49-F238E27FC236}">
+                <a16:creationId xmlns:a16="http://schemas.microsoft.com/office/drawing/2014/main" id="{8303FBD5-16A9-44A5-9902-081BDDF737E8}"/>
+              </a:ext>
+            </a:extLst>
+          </p:cNvPr>
+          <p:cNvSpPr/>
+          <p:nvPr/>
+        </p:nvSpPr>
+        <p:spPr>
+          <a:xfrm>
+            <a:off x="7415310" y="2065953"/>
+            <a:ext cx="401216" cy="354563"/>
+          </a:xfrm>
+          <a:prstGeom prst="ellipse">
+            <a:avLst/>
+          </a:prstGeom>
+          <a:solidFill>
+            <a:schemeClr val="bg1">
+              <a:lumMod val="65000"/>
+            </a:schemeClr>
+          </a:solidFill>
+          <a:ln>
+            <a:solidFill>
+              <a:schemeClr val="bg1">
+                <a:lumMod val="65000"/>
+              </a:schemeClr>
+            </a:solidFill>
+          </a:ln>
+        </p:spPr>
+        <p:style>
+          <a:lnRef idx="2">
+            <a:schemeClr val="accent1">
+              <a:shade val="50000"/>
+            </a:schemeClr>
+          </a:lnRef>
+          <a:fillRef idx="1">
+            <a:schemeClr val="accent1"/>
+          </a:fillRef>
+          <a:effectRef idx="0">
+            <a:schemeClr val="accent1"/>
+          </a:effectRef>
+          <a:fontRef idx="minor">
+            <a:schemeClr val="lt1"/>
+          </a:fontRef>
+        </p:style>
+        <p:txBody>
+          <a:bodyPr rtlCol="0" anchor="ctr"/>
+          <a:lstStyle/>
+          <a:p>
+            <a:pPr algn="ctr"/>
+            <a:endParaRPr lang="en-US"/>
+          </a:p>
+        </p:txBody>
+      </p:sp>
+      <p:sp>
+        <p:nvSpPr>
+          <p:cNvPr id="9" name="Oval 8">
+            <a:extLst>
+              <a:ext uri="{FF2B5EF4-FFF2-40B4-BE49-F238E27FC236}">
+                <a16:creationId xmlns:a16="http://schemas.microsoft.com/office/drawing/2014/main" id="{F854AB20-71AE-45D9-A2AF-B5FBEF5DFD02}"/>
+              </a:ext>
+            </a:extLst>
+          </p:cNvPr>
+          <p:cNvSpPr/>
+          <p:nvPr/>
+        </p:nvSpPr>
+        <p:spPr>
+          <a:xfrm>
+            <a:off x="5218793" y="5280335"/>
+            <a:ext cx="274320" cy="274320"/>
+          </a:xfrm>
+          <a:prstGeom prst="ellipse">
+            <a:avLst/>
+          </a:prstGeom>
+          <a:solidFill>
+            <a:schemeClr val="bg1">
+              <a:lumMod val="65000"/>
+            </a:schemeClr>
+          </a:solidFill>
+          <a:ln>
+            <a:solidFill>
+              <a:schemeClr val="bg1">
+                <a:lumMod val="65000"/>
+              </a:schemeClr>
+            </a:solidFill>
+          </a:ln>
+        </p:spPr>
+        <p:style>
+          <a:lnRef idx="2">
+            <a:schemeClr val="accent1">
+              <a:shade val="50000"/>
+            </a:schemeClr>
+          </a:lnRef>
+          <a:fillRef idx="1">
+            <a:schemeClr val="accent1"/>
+          </a:fillRef>
+          <a:effectRef idx="0">
+            <a:schemeClr val="accent1"/>
+          </a:effectRef>
+          <a:fontRef idx="minor">
+            <a:schemeClr val="lt1"/>
+          </a:fontRef>
+        </p:style>
+        <p:txBody>
+          <a:bodyPr rtlCol="0" anchor="ctr"/>
+          <a:lstStyle/>
+          <a:p>
+            <a:pPr algn="ctr"/>
+            <a:endParaRPr lang="en-US"/>
+          </a:p>
+        </p:txBody>
+      </p:sp>
+      <p:sp>
+        <p:nvSpPr>
+          <p:cNvPr id="10" name="Oval 9">
+            <a:extLst>
+              <a:ext uri="{FF2B5EF4-FFF2-40B4-BE49-F238E27FC236}">
+                <a16:creationId xmlns:a16="http://schemas.microsoft.com/office/drawing/2014/main" id="{C2B2B493-1F74-4F46-B9BF-9EFF645B2F98}"/>
+              </a:ext>
+            </a:extLst>
+          </p:cNvPr>
+          <p:cNvSpPr>
+            <a:spLocks noChangeAspect="1"/>
+          </p:cNvSpPr>
+          <p:nvPr/>
+        </p:nvSpPr>
+        <p:spPr>
+          <a:xfrm>
+            <a:off x="5694784" y="2897155"/>
+            <a:ext cx="274320" cy="274320"/>
+          </a:xfrm>
+          <a:prstGeom prst="ellipse">
+            <a:avLst/>
+          </a:prstGeom>
+          <a:solidFill>
+            <a:schemeClr val="bg1">
+              <a:lumMod val="65000"/>
+            </a:schemeClr>
+          </a:solidFill>
+          <a:ln>
+            <a:solidFill>
+              <a:schemeClr val="bg1">
+                <a:lumMod val="65000"/>
+              </a:schemeClr>
+            </a:solidFill>
+          </a:ln>
+        </p:spPr>
+        <p:style>
+          <a:lnRef idx="2">
+            <a:schemeClr val="accent1">
+              <a:shade val="50000"/>
+            </a:schemeClr>
+          </a:lnRef>
+          <a:fillRef idx="1">
+            <a:schemeClr val="accent1"/>
+          </a:fillRef>
+          <a:effectRef idx="0">
+            <a:schemeClr val="accent1"/>
+          </a:effectRef>
+          <a:fontRef idx="minor">
+            <a:schemeClr val="lt1"/>
+          </a:fontRef>
+        </p:style>
+        <p:txBody>
+          <a:bodyPr rtlCol="0" anchor="ctr"/>
+          <a:lstStyle/>
+          <a:p>
+            <a:pPr algn="ctr"/>
+            <a:endParaRPr lang="en-US"/>
+          </a:p>
+        </p:txBody>
+      </p:sp>
+      <p:sp>
+        <p:nvSpPr>
+          <p:cNvPr id="11" name="Oval 10">
+            <a:extLst>
+              <a:ext uri="{FF2B5EF4-FFF2-40B4-BE49-F238E27FC236}">
+                <a16:creationId xmlns:a16="http://schemas.microsoft.com/office/drawing/2014/main" id="{DAA165A3-7217-4064-ABBB-0908D3F9304A}"/>
+              </a:ext>
+            </a:extLst>
+          </p:cNvPr>
+          <p:cNvSpPr/>
+          <p:nvPr/>
+        </p:nvSpPr>
+        <p:spPr>
+          <a:xfrm>
+            <a:off x="8233237" y="4712679"/>
+            <a:ext cx="548640" cy="548640"/>
+          </a:xfrm>
+          <a:prstGeom prst="ellipse">
+            <a:avLst/>
+          </a:prstGeom>
+          <a:solidFill>
+            <a:schemeClr val="bg1">
+              <a:lumMod val="65000"/>
+            </a:schemeClr>
+          </a:solidFill>
+          <a:ln>
+            <a:solidFill>
+              <a:schemeClr val="bg1">
+                <a:lumMod val="65000"/>
+              </a:schemeClr>
+            </a:solidFill>
+          </a:ln>
+        </p:spPr>
+        <p:style>
+          <a:lnRef idx="2">
+            <a:schemeClr val="accent1">
+              <a:shade val="50000"/>
+            </a:schemeClr>
+          </a:lnRef>
+          <a:fillRef idx="1">
+            <a:schemeClr val="accent1"/>
+          </a:fillRef>
+          <a:effectRef idx="0">
+            <a:schemeClr val="accent1"/>
+          </a:effectRef>
+          <a:fontRef idx="minor">
+            <a:schemeClr val="lt1"/>
+          </a:fontRef>
+        </p:style>
+        <p:txBody>
+          <a:bodyPr rtlCol="0" anchor="ctr"/>
+          <a:lstStyle/>
+          <a:p>
+            <a:pPr algn="ctr"/>
+            <a:endParaRPr lang="en-US"/>
+          </a:p>
+        </p:txBody>
+      </p:sp>
+      <p:sp>
+        <p:nvSpPr>
+          <p:cNvPr id="12" name="Oval 11">
+            <a:extLst>
+              <a:ext uri="{FF2B5EF4-FFF2-40B4-BE49-F238E27FC236}">
+                <a16:creationId xmlns:a16="http://schemas.microsoft.com/office/drawing/2014/main" id="{246F53E2-7237-468D-A46F-D774148943AE}"/>
+              </a:ext>
+            </a:extLst>
+          </p:cNvPr>
+          <p:cNvSpPr/>
+          <p:nvPr/>
+        </p:nvSpPr>
+        <p:spPr>
+          <a:xfrm>
+            <a:off x="3838804" y="1467538"/>
+            <a:ext cx="182880" cy="182880"/>
+          </a:xfrm>
+          <a:prstGeom prst="ellipse">
+            <a:avLst/>
+          </a:prstGeom>
+          <a:solidFill>
+            <a:schemeClr val="bg1">
+              <a:lumMod val="65000"/>
+            </a:schemeClr>
+          </a:solidFill>
+          <a:ln>
+            <a:solidFill>
+              <a:schemeClr val="bg1">
+                <a:lumMod val="65000"/>
+              </a:schemeClr>
+            </a:solidFill>
+          </a:ln>
+        </p:spPr>
+        <p:style>
+          <a:lnRef idx="2">
+            <a:schemeClr val="accent1">
+              <a:shade val="50000"/>
+            </a:schemeClr>
+          </a:lnRef>
+          <a:fillRef idx="1">
+            <a:schemeClr val="accent1"/>
+          </a:fillRef>
+          <a:effectRef idx="0">
+            <a:schemeClr val="accent1"/>
+          </a:effectRef>
+          <a:fontRef idx="minor">
+            <a:schemeClr val="lt1"/>
+          </a:fontRef>
+        </p:style>
+        <p:txBody>
+          <a:bodyPr rtlCol="0" anchor="ctr"/>
+          <a:lstStyle/>
+          <a:p>
+            <a:pPr algn="ctr"/>
+            <a:endParaRPr lang="en-US"/>
+          </a:p>
+        </p:txBody>
+      </p:sp>
+      <p:sp>
+        <p:nvSpPr>
+          <p:cNvPr id="13" name="Oval 12">
+            <a:extLst>
+              <a:ext uri="{FF2B5EF4-FFF2-40B4-BE49-F238E27FC236}">
+                <a16:creationId xmlns:a16="http://schemas.microsoft.com/office/drawing/2014/main" id="{C9840180-3891-4AA4-B1AF-AFE262AEDF10}"/>
+              </a:ext>
+            </a:extLst>
+          </p:cNvPr>
+          <p:cNvSpPr/>
+          <p:nvPr/>
+        </p:nvSpPr>
+        <p:spPr>
+          <a:xfrm>
+            <a:off x="3051636" y="3251718"/>
+            <a:ext cx="365760" cy="365760"/>
+          </a:xfrm>
+          <a:prstGeom prst="ellipse">
+            <a:avLst/>
+          </a:prstGeom>
+          <a:solidFill>
+            <a:schemeClr val="bg1">
+              <a:lumMod val="65000"/>
+            </a:schemeClr>
+          </a:solidFill>
+          <a:ln>
+            <a:solidFill>
+              <a:schemeClr val="bg1">
+                <a:lumMod val="65000"/>
+              </a:schemeClr>
+            </a:solidFill>
+          </a:ln>
+        </p:spPr>
+        <p:style>
+          <a:lnRef idx="2">
+            <a:schemeClr val="accent1">
+              <a:shade val="50000"/>
+            </a:schemeClr>
+          </a:lnRef>
+          <a:fillRef idx="1">
+            <a:schemeClr val="accent1"/>
+          </a:fillRef>
+          <a:effectRef idx="0">
+            <a:schemeClr val="accent1"/>
+          </a:effectRef>
+          <a:fontRef idx="minor">
+            <a:schemeClr val="lt1"/>
+          </a:fontRef>
+        </p:style>
+        <p:txBody>
+          <a:bodyPr rtlCol="0" anchor="ctr"/>
+          <a:lstStyle/>
+          <a:p>
+            <a:pPr algn="ctr"/>
+            <a:endParaRPr lang="en-US"/>
+          </a:p>
+        </p:txBody>
+      </p:sp>
+      <p:sp>
+        <p:nvSpPr>
+          <p:cNvPr id="14" name="Oval 13">
+            <a:extLst>
+              <a:ext uri="{FF2B5EF4-FFF2-40B4-BE49-F238E27FC236}">
+                <a16:creationId xmlns:a16="http://schemas.microsoft.com/office/drawing/2014/main" id="{7478957C-B4BD-4E88-B6E3-C5C75398642F}"/>
+              </a:ext>
+            </a:extLst>
+          </p:cNvPr>
+          <p:cNvSpPr/>
+          <p:nvPr/>
+        </p:nvSpPr>
+        <p:spPr>
+          <a:xfrm>
+            <a:off x="6123405" y="1467537"/>
+            <a:ext cx="401216" cy="354563"/>
+          </a:xfrm>
+          <a:prstGeom prst="ellipse">
+            <a:avLst/>
+          </a:prstGeom>
+          <a:solidFill>
+            <a:schemeClr val="bg1">
+              <a:lumMod val="65000"/>
+            </a:schemeClr>
+          </a:solidFill>
+          <a:ln>
+            <a:solidFill>
+              <a:schemeClr val="bg1">
+                <a:lumMod val="65000"/>
+              </a:schemeClr>
+            </a:solidFill>
+          </a:ln>
+        </p:spPr>
+        <p:style>
+          <a:lnRef idx="2">
+            <a:schemeClr val="accent1">
+              <a:shade val="50000"/>
+            </a:schemeClr>
+          </a:lnRef>
+          <a:fillRef idx="1">
+            <a:schemeClr val="accent1"/>
+          </a:fillRef>
+          <a:effectRef idx="0">
+            <a:schemeClr val="accent1"/>
+          </a:effectRef>
+          <a:fontRef idx="minor">
+            <a:schemeClr val="lt1"/>
+          </a:fontRef>
+        </p:style>
+        <p:txBody>
+          <a:bodyPr rtlCol="0" anchor="ctr"/>
+          <a:lstStyle/>
+          <a:p>
+            <a:pPr algn="ctr"/>
+            <a:endParaRPr lang="en-US"/>
+          </a:p>
+        </p:txBody>
+      </p:sp>
+      <p:sp>
+        <p:nvSpPr>
+          <p:cNvPr id="15" name="Oval 14">
+            <a:extLst>
+              <a:ext uri="{FF2B5EF4-FFF2-40B4-BE49-F238E27FC236}">
+                <a16:creationId xmlns:a16="http://schemas.microsoft.com/office/drawing/2014/main" id="{C9A1D4F3-C8CB-468B-89D8-8AAD22CABAEB}"/>
+              </a:ext>
+            </a:extLst>
+          </p:cNvPr>
+          <p:cNvSpPr/>
+          <p:nvPr/>
+        </p:nvSpPr>
+        <p:spPr>
+          <a:xfrm>
+            <a:off x="3317431" y="4664278"/>
+            <a:ext cx="182880" cy="182880"/>
+          </a:xfrm>
+          <a:prstGeom prst="ellipse">
+            <a:avLst/>
+          </a:prstGeom>
+          <a:solidFill>
+            <a:schemeClr val="bg1">
+              <a:lumMod val="65000"/>
+            </a:schemeClr>
+          </a:solidFill>
+          <a:ln>
+            <a:solidFill>
+              <a:schemeClr val="bg1">
+                <a:lumMod val="65000"/>
+              </a:schemeClr>
+            </a:solidFill>
+          </a:ln>
+        </p:spPr>
+        <p:style>
+          <a:lnRef idx="2">
+            <a:schemeClr val="accent1">
+              <a:shade val="50000"/>
+            </a:schemeClr>
+          </a:lnRef>
+          <a:fillRef idx="1">
+            <a:schemeClr val="accent1"/>
+          </a:fillRef>
+          <a:effectRef idx="0">
+            <a:schemeClr val="accent1"/>
+          </a:effectRef>
+          <a:fontRef idx="minor">
+            <a:schemeClr val="lt1"/>
+          </a:fontRef>
+        </p:style>
+        <p:txBody>
+          <a:bodyPr rtlCol="0" anchor="ctr"/>
+          <a:lstStyle/>
+          <a:p>
+            <a:pPr algn="ctr"/>
+            <a:endParaRPr lang="en-US"/>
+          </a:p>
+        </p:txBody>
+      </p:sp>
+      <p:sp>
+        <p:nvSpPr>
+          <p:cNvPr id="16" name="Oval 15">
+            <a:extLst>
+              <a:ext uri="{FF2B5EF4-FFF2-40B4-BE49-F238E27FC236}">
+                <a16:creationId xmlns:a16="http://schemas.microsoft.com/office/drawing/2014/main" id="{DCFDCC52-9E5B-4F65-BADE-7C6862CC10A3}"/>
+              </a:ext>
+            </a:extLst>
+          </p:cNvPr>
+          <p:cNvSpPr/>
+          <p:nvPr/>
+        </p:nvSpPr>
+        <p:spPr>
+          <a:xfrm>
+            <a:off x="9122470" y="1290255"/>
+            <a:ext cx="640080" cy="640080"/>
+          </a:xfrm>
+          <a:prstGeom prst="ellipse">
+            <a:avLst/>
+          </a:prstGeom>
+          <a:solidFill>
+            <a:schemeClr val="bg1">
+              <a:lumMod val="65000"/>
+            </a:schemeClr>
+          </a:solidFill>
+          <a:ln>
+            <a:solidFill>
+              <a:schemeClr val="bg1">
+                <a:lumMod val="65000"/>
+              </a:schemeClr>
+            </a:solidFill>
+          </a:ln>
+        </p:spPr>
+        <p:style>
+          <a:lnRef idx="2">
+            <a:schemeClr val="accent1">
+              <a:shade val="50000"/>
+            </a:schemeClr>
+          </a:lnRef>
+          <a:fillRef idx="1">
+            <a:schemeClr val="accent1"/>
+          </a:fillRef>
+          <a:effectRef idx="0">
+            <a:schemeClr val="accent1"/>
+          </a:effectRef>
+          <a:fontRef idx="minor">
+            <a:schemeClr val="lt1"/>
+          </a:fontRef>
+        </p:style>
+        <p:txBody>
+          <a:bodyPr rtlCol="0" anchor="ctr"/>
+          <a:lstStyle/>
+          <a:p>
+            <a:pPr algn="ctr"/>
+            <a:endParaRPr lang="en-US"/>
+          </a:p>
+        </p:txBody>
+      </p:sp>
+      <p:sp>
+        <p:nvSpPr>
+          <p:cNvPr id="17" name="TextBox 16">
+            <a:extLst>
+              <a:ext uri="{FF2B5EF4-FFF2-40B4-BE49-F238E27FC236}">
+                <a16:creationId xmlns:a16="http://schemas.microsoft.com/office/drawing/2014/main" id="{D717D228-C992-421A-B5BB-B04E1CC1DCA5}"/>
+              </a:ext>
+            </a:extLst>
+          </p:cNvPr>
+          <p:cNvSpPr txBox="1"/>
+          <p:nvPr/>
+        </p:nvSpPr>
+        <p:spPr>
+          <a:xfrm>
+            <a:off x="3991997" y="97522"/>
+            <a:ext cx="3890810" cy="584775"/>
+          </a:xfrm>
+          <a:prstGeom prst="rect">
+            <a:avLst/>
+          </a:prstGeom>
+          <a:noFill/>
+        </p:spPr>
+        <p:txBody>
+          <a:bodyPr wrap="none" rtlCol="0">
+            <a:spAutoFit/>
+          </a:bodyPr>
+          <a:lstStyle/>
+          <a:p>
+            <a:pPr algn="ctr"/>
+            <a:r>
+              <a:rPr lang="en-US" sz="3200" dirty="0">
+                <a:solidFill>
+                  <a:schemeClr val="bg1"/>
+                </a:solidFill>
+              </a:rPr>
+              <a:t>Target Selection: Basic</a:t>
+            </a:r>
+            <a:endParaRPr lang="en-US" dirty="0">
+              <a:solidFill>
+                <a:schemeClr val="bg1"/>
+              </a:solidFill>
+            </a:endParaRPr>
+          </a:p>
+        </p:txBody>
+      </p:sp>
+      <p:grpSp>
+        <p:nvGrpSpPr>
+          <p:cNvPr id="22" name="Group 21">
+            <a:extLst>
+              <a:ext uri="{FF2B5EF4-FFF2-40B4-BE49-F238E27FC236}">
+                <a16:creationId xmlns:a16="http://schemas.microsoft.com/office/drawing/2014/main" id="{37BEDDE7-4021-49B4-90A9-CE469A103EDC}"/>
+              </a:ext>
+            </a:extLst>
+          </p:cNvPr>
+          <p:cNvGrpSpPr/>
+          <p:nvPr/>
+        </p:nvGrpSpPr>
+        <p:grpSpPr>
+          <a:xfrm>
+            <a:off x="5511904" y="2714275"/>
+            <a:ext cx="640080" cy="640080"/>
+            <a:chOff x="2015412" y="1744824"/>
+            <a:chExt cx="640080" cy="640080"/>
+          </a:xfrm>
+        </p:grpSpPr>
+        <p:sp>
+          <p:nvSpPr>
+            <p:cNvPr id="2" name="Oval 1">
+              <a:extLst>
+                <a:ext uri="{FF2B5EF4-FFF2-40B4-BE49-F238E27FC236}">
+                  <a16:creationId xmlns:a16="http://schemas.microsoft.com/office/drawing/2014/main" id="{6BF54936-D3CD-4558-B225-0836F71134D8}"/>
+                </a:ext>
+              </a:extLst>
+            </p:cNvPr>
+            <p:cNvSpPr>
+              <a:spLocks noChangeAspect="1"/>
+            </p:cNvSpPr>
+            <p:nvPr/>
+          </p:nvSpPr>
+          <p:spPr>
+            <a:xfrm>
+              <a:off x="2015412" y="1744824"/>
+              <a:ext cx="640080" cy="640080"/>
+            </a:xfrm>
+            <a:prstGeom prst="ellipse">
+              <a:avLst/>
+            </a:prstGeom>
+            <a:noFill/>
+            <a:ln>
+              <a:solidFill>
+                <a:srgbClr val="FF0000"/>
+              </a:solidFill>
+            </a:ln>
+          </p:spPr>
+          <p:style>
+            <a:lnRef idx="2">
+              <a:schemeClr val="accent1">
+                <a:shade val="50000"/>
+              </a:schemeClr>
+            </a:lnRef>
+            <a:fillRef idx="1">
+              <a:schemeClr val="accent1"/>
+            </a:fillRef>
+            <a:effectRef idx="0">
+              <a:schemeClr val="accent1"/>
+            </a:effectRef>
+            <a:fontRef idx="minor">
+              <a:schemeClr val="lt1"/>
+            </a:fontRef>
+          </p:style>
+          <p:txBody>
+            <a:bodyPr rtlCol="0" anchor="ctr"/>
+            <a:lstStyle/>
+            <a:p>
+              <a:pPr algn="ctr"/>
+              <a:endParaRPr lang="en-US"/>
+            </a:p>
+          </p:txBody>
+        </p:sp>
+        <p:cxnSp>
+          <p:nvCxnSpPr>
+            <p:cNvPr id="19" name="Straight Connector 18">
+              <a:extLst>
+                <a:ext uri="{FF2B5EF4-FFF2-40B4-BE49-F238E27FC236}">
+                  <a16:creationId xmlns:a16="http://schemas.microsoft.com/office/drawing/2014/main" id="{3DEAA90E-5A72-4D08-8CD7-D3CE54397A41}"/>
+                </a:ext>
+              </a:extLst>
+            </p:cNvPr>
+            <p:cNvCxnSpPr>
+              <a:stCxn id="2" idx="0"/>
+              <a:endCxn id="2" idx="4"/>
+            </p:cNvCxnSpPr>
+            <p:nvPr/>
+          </p:nvCxnSpPr>
+          <p:spPr>
+            <a:xfrm>
+              <a:off x="2335452" y="1744824"/>
+              <a:ext cx="0" cy="640080"/>
+            </a:xfrm>
+            <a:prstGeom prst="line">
+              <a:avLst/>
+            </a:prstGeom>
+            <a:ln>
+              <a:solidFill>
+                <a:srgbClr val="FF0000"/>
+              </a:solidFill>
+            </a:ln>
+          </p:spPr>
+          <p:style>
+            <a:lnRef idx="1">
+              <a:schemeClr val="accent1"/>
+            </a:lnRef>
+            <a:fillRef idx="0">
+              <a:schemeClr val="accent1"/>
+            </a:fillRef>
+            <a:effectRef idx="0">
+              <a:schemeClr val="accent1"/>
+            </a:effectRef>
+            <a:fontRef idx="minor">
+              <a:schemeClr val="tx1"/>
+            </a:fontRef>
+          </p:style>
+        </p:cxnSp>
+        <p:cxnSp>
+          <p:nvCxnSpPr>
+            <p:cNvPr id="21" name="Straight Connector 20">
+              <a:extLst>
+                <a:ext uri="{FF2B5EF4-FFF2-40B4-BE49-F238E27FC236}">
+                  <a16:creationId xmlns:a16="http://schemas.microsoft.com/office/drawing/2014/main" id="{1B96C074-5CB4-493F-BAEE-D9C54C2F0957}"/>
+                </a:ext>
+              </a:extLst>
+            </p:cNvPr>
+            <p:cNvCxnSpPr>
+              <a:stCxn id="2" idx="2"/>
+              <a:endCxn id="2" idx="6"/>
+            </p:cNvCxnSpPr>
+            <p:nvPr/>
+          </p:nvCxnSpPr>
+          <p:spPr>
+            <a:xfrm>
+              <a:off x="2015412" y="2064864"/>
+              <a:ext cx="640080" cy="0"/>
+            </a:xfrm>
+            <a:prstGeom prst="line">
+              <a:avLst/>
+            </a:prstGeom>
+            <a:ln>
+              <a:solidFill>
+                <a:srgbClr val="FF0000"/>
+              </a:solidFill>
+            </a:ln>
+          </p:spPr>
+          <p:style>
+            <a:lnRef idx="1">
+              <a:schemeClr val="accent1"/>
+            </a:lnRef>
+            <a:fillRef idx="0">
+              <a:schemeClr val="accent1"/>
+            </a:fillRef>
+            <a:effectRef idx="0">
+              <a:schemeClr val="accent1"/>
+            </a:effectRef>
+            <a:fontRef idx="minor">
+              <a:schemeClr val="tx1"/>
+            </a:fontRef>
+          </p:style>
+        </p:cxnSp>
+      </p:grpSp>
+      <p:sp>
+        <p:nvSpPr>
+          <p:cNvPr id="23" name="TextBox 22">
+            <a:extLst>
+              <a:ext uri="{FF2B5EF4-FFF2-40B4-BE49-F238E27FC236}">
+                <a16:creationId xmlns:a16="http://schemas.microsoft.com/office/drawing/2014/main" id="{174FDE56-DFDC-4645-AC36-85162AA5C8D9}"/>
+              </a:ext>
+            </a:extLst>
+          </p:cNvPr>
+          <p:cNvSpPr txBox="1"/>
+          <p:nvPr/>
+        </p:nvSpPr>
+        <p:spPr>
+          <a:xfrm>
+            <a:off x="136843" y="1173251"/>
+            <a:ext cx="2796857" cy="4555093"/>
+          </a:xfrm>
+          <a:prstGeom prst="rect">
+            <a:avLst/>
+          </a:prstGeom>
+          <a:noFill/>
+        </p:spPr>
+        <p:txBody>
+          <a:bodyPr wrap="square" rtlCol="0">
+            <a:spAutoFit/>
+          </a:bodyPr>
+          <a:lstStyle/>
+          <a:p>
+            <a:r>
+              <a:rPr lang="en-US" sz="1400" dirty="0">
+                <a:solidFill>
+                  <a:schemeClr val="bg1"/>
+                </a:solidFill>
+              </a:rPr>
+              <a:t>Since we are restricting the ship to only have forward thrust, the aiming and the movement will affect each other. </a:t>
+            </a:r>
+          </a:p>
+          <a:p>
+            <a:endParaRPr lang="en-US" sz="1400" dirty="0">
+              <a:solidFill>
+                <a:schemeClr val="bg1"/>
+              </a:solidFill>
+            </a:endParaRPr>
+          </a:p>
+          <a:p>
+            <a:r>
+              <a:rPr lang="en-US" sz="1400" dirty="0">
+                <a:solidFill>
+                  <a:schemeClr val="bg1"/>
+                </a:solidFill>
+              </a:rPr>
+              <a:t>The basic target selection algorithm will rank targets as a function of their distance. There are some obvious problems with this (like what about the size of the asteroids? Should you shoot and break a close asteroid and make more small pieces to deal with?)</a:t>
+            </a:r>
+          </a:p>
+          <a:p>
+            <a:endParaRPr lang="en-US" sz="1400" dirty="0">
+              <a:solidFill>
+                <a:schemeClr val="bg1"/>
+              </a:solidFill>
+            </a:endParaRPr>
+          </a:p>
+          <a:p>
+            <a:r>
+              <a:rPr lang="en-US" sz="1400" dirty="0">
+                <a:solidFill>
+                  <a:schemeClr val="bg1"/>
+                </a:solidFill>
+              </a:rPr>
+              <a:t>Target selection doesn’t mean that we are shooting at it now. It just assigns a priority to the targets. The actual shooting will be done based on where the ship is pointing and where it needs to move to.</a:t>
+            </a:r>
+          </a:p>
+          <a:p>
+            <a:endParaRPr lang="en-US" sz="1000" dirty="0">
+              <a:solidFill>
+                <a:schemeClr val="bg1"/>
+              </a:solidFill>
+            </a:endParaRPr>
+          </a:p>
+        </p:txBody>
+      </p:sp>
+    </p:spTree>
+    <p:extLst>
+      <p:ext uri="{BB962C8B-B14F-4D97-AF65-F5344CB8AC3E}">
         <p14:creationId xmlns:p14="http://schemas.microsoft.com/office/powerpoint/2010/main" val="3705736557"/>
+      </p:ext>
+    </p:extLst>
+  </p:cSld>
+  <p:clrMapOvr>
+    <a:masterClrMapping/>
+  </p:clrMapOvr>
+</p:sld>
+</file>
+
+<file path=ppt/slides/slide9.xml><?xml version="1.0" encoding="utf-8"?>
+<p:sld xmlns:a="http://schemas.openxmlformats.org/drawingml/2006/main" xmlns:r="http://schemas.openxmlformats.org/officeDocument/2006/relationships" xmlns:p="http://schemas.openxmlformats.org/presentationml/2006/main">
+  <p:cSld>
+    <p:bg>
+      <p:bgPr>
+        <a:solidFill>
+          <a:schemeClr val="tx1"/>
+        </a:solidFill>
+        <a:effectLst/>
+      </p:bgPr>
+    </p:bg>
+    <p:spTree>
+      <p:nvGrpSpPr>
+        <p:cNvPr id="1" name=""/>
+        <p:cNvGrpSpPr/>
+        <p:nvPr/>
+      </p:nvGrpSpPr>
+      <p:grpSpPr>
+        <a:xfrm>
+          <a:off x="0" y="0"/>
+          <a:ext cx="0" cy="0"/>
+          <a:chOff x="0" y="0"/>
+          <a:chExt cx="0" cy="0"/>
+        </a:xfrm>
+      </p:grpSpPr>
+      <p:sp>
+        <p:nvSpPr>
+          <p:cNvPr id="3" name="Isosceles Triangle 2">
+            <a:extLst>
+              <a:ext uri="{FF2B5EF4-FFF2-40B4-BE49-F238E27FC236}">
+                <a16:creationId xmlns:a16="http://schemas.microsoft.com/office/drawing/2014/main" id="{DA7622A9-817A-4D51-919E-415116300416}"/>
+              </a:ext>
+            </a:extLst>
+          </p:cNvPr>
+          <p:cNvSpPr/>
+          <p:nvPr/>
+        </p:nvSpPr>
+        <p:spPr>
+          <a:xfrm rot="2603727">
+            <a:off x="5623832" y="3913414"/>
+            <a:ext cx="233265" cy="326572"/>
+          </a:xfrm>
+          <a:prstGeom prst="triangle">
+            <a:avLst/>
+          </a:prstGeom>
+          <a:solidFill>
+            <a:schemeClr val="bg1"/>
+          </a:solidFill>
+          <a:ln>
+            <a:solidFill>
+              <a:schemeClr val="bg1"/>
+            </a:solidFill>
+          </a:ln>
+        </p:spPr>
+        <p:style>
+          <a:lnRef idx="2">
+            <a:schemeClr val="accent1">
+              <a:shade val="50000"/>
+            </a:schemeClr>
+          </a:lnRef>
+          <a:fillRef idx="1">
+            <a:schemeClr val="accent1"/>
+          </a:fillRef>
+          <a:effectRef idx="0">
+            <a:schemeClr val="accent1"/>
+          </a:effectRef>
+          <a:fontRef idx="minor">
+            <a:schemeClr val="lt1"/>
+          </a:fontRef>
+        </p:style>
+        <p:txBody>
+          <a:bodyPr rtlCol="0" anchor="ctr"/>
+          <a:lstStyle/>
+          <a:p>
+            <a:pPr algn="ctr"/>
+            <a:endParaRPr lang="en-US"/>
+          </a:p>
+        </p:txBody>
+      </p:sp>
+      <p:sp>
+        <p:nvSpPr>
+          <p:cNvPr id="5" name="Oval 4">
+            <a:extLst>
+              <a:ext uri="{FF2B5EF4-FFF2-40B4-BE49-F238E27FC236}">
+                <a16:creationId xmlns:a16="http://schemas.microsoft.com/office/drawing/2014/main" id="{8303FBD5-16A9-44A5-9902-081BDDF737E8}"/>
+              </a:ext>
+            </a:extLst>
+          </p:cNvPr>
+          <p:cNvSpPr/>
+          <p:nvPr/>
+        </p:nvSpPr>
+        <p:spPr>
+          <a:xfrm>
+            <a:off x="7415310" y="2065953"/>
+            <a:ext cx="401216" cy="354563"/>
+          </a:xfrm>
+          <a:prstGeom prst="ellipse">
+            <a:avLst/>
+          </a:prstGeom>
+          <a:solidFill>
+            <a:schemeClr val="bg1">
+              <a:lumMod val="65000"/>
+            </a:schemeClr>
+          </a:solidFill>
+          <a:ln>
+            <a:solidFill>
+              <a:schemeClr val="bg1">
+                <a:lumMod val="65000"/>
+              </a:schemeClr>
+            </a:solidFill>
+          </a:ln>
+        </p:spPr>
+        <p:style>
+          <a:lnRef idx="2">
+            <a:schemeClr val="accent1">
+              <a:shade val="50000"/>
+            </a:schemeClr>
+          </a:lnRef>
+          <a:fillRef idx="1">
+            <a:schemeClr val="accent1"/>
+          </a:fillRef>
+          <a:effectRef idx="0">
+            <a:schemeClr val="accent1"/>
+          </a:effectRef>
+          <a:fontRef idx="minor">
+            <a:schemeClr val="lt1"/>
+          </a:fontRef>
+        </p:style>
+        <p:txBody>
+          <a:bodyPr rtlCol="0" anchor="ctr"/>
+          <a:lstStyle/>
+          <a:p>
+            <a:pPr algn="ctr"/>
+            <a:endParaRPr lang="en-US"/>
+          </a:p>
+        </p:txBody>
+      </p:sp>
+      <p:sp>
+        <p:nvSpPr>
+          <p:cNvPr id="9" name="Oval 8">
+            <a:extLst>
+              <a:ext uri="{FF2B5EF4-FFF2-40B4-BE49-F238E27FC236}">
+                <a16:creationId xmlns:a16="http://schemas.microsoft.com/office/drawing/2014/main" id="{F854AB20-71AE-45D9-A2AF-B5FBEF5DFD02}"/>
+              </a:ext>
+            </a:extLst>
+          </p:cNvPr>
+          <p:cNvSpPr/>
+          <p:nvPr/>
+        </p:nvSpPr>
+        <p:spPr>
+          <a:xfrm>
+            <a:off x="5218793" y="5280335"/>
+            <a:ext cx="274320" cy="274320"/>
+          </a:xfrm>
+          <a:prstGeom prst="ellipse">
+            <a:avLst/>
+          </a:prstGeom>
+          <a:solidFill>
+            <a:schemeClr val="bg1">
+              <a:lumMod val="65000"/>
+            </a:schemeClr>
+          </a:solidFill>
+          <a:ln>
+            <a:solidFill>
+              <a:schemeClr val="bg1">
+                <a:lumMod val="65000"/>
+              </a:schemeClr>
+            </a:solidFill>
+          </a:ln>
+        </p:spPr>
+        <p:style>
+          <a:lnRef idx="2">
+            <a:schemeClr val="accent1">
+              <a:shade val="50000"/>
+            </a:schemeClr>
+          </a:lnRef>
+          <a:fillRef idx="1">
+            <a:schemeClr val="accent1"/>
+          </a:fillRef>
+          <a:effectRef idx="0">
+            <a:schemeClr val="accent1"/>
+          </a:effectRef>
+          <a:fontRef idx="minor">
+            <a:schemeClr val="lt1"/>
+          </a:fontRef>
+        </p:style>
+        <p:txBody>
+          <a:bodyPr rtlCol="0" anchor="ctr"/>
+          <a:lstStyle/>
+          <a:p>
+            <a:pPr algn="ctr"/>
+            <a:endParaRPr lang="en-US"/>
+          </a:p>
+        </p:txBody>
+      </p:sp>
+      <p:sp>
+        <p:nvSpPr>
+          <p:cNvPr id="10" name="Oval 9">
+            <a:extLst>
+              <a:ext uri="{FF2B5EF4-FFF2-40B4-BE49-F238E27FC236}">
+                <a16:creationId xmlns:a16="http://schemas.microsoft.com/office/drawing/2014/main" id="{C2B2B493-1F74-4F46-B9BF-9EFF645B2F98}"/>
+              </a:ext>
+            </a:extLst>
+          </p:cNvPr>
+          <p:cNvSpPr>
+            <a:spLocks noChangeAspect="1"/>
+          </p:cNvSpPr>
+          <p:nvPr/>
+        </p:nvSpPr>
+        <p:spPr>
+          <a:xfrm>
+            <a:off x="5694784" y="2897155"/>
+            <a:ext cx="274320" cy="274320"/>
+          </a:xfrm>
+          <a:prstGeom prst="ellipse">
+            <a:avLst/>
+          </a:prstGeom>
+          <a:solidFill>
+            <a:schemeClr val="bg1">
+              <a:lumMod val="65000"/>
+            </a:schemeClr>
+          </a:solidFill>
+          <a:ln>
+            <a:solidFill>
+              <a:schemeClr val="bg1">
+                <a:lumMod val="65000"/>
+              </a:schemeClr>
+            </a:solidFill>
+          </a:ln>
+        </p:spPr>
+        <p:style>
+          <a:lnRef idx="2">
+            <a:schemeClr val="accent1">
+              <a:shade val="50000"/>
+            </a:schemeClr>
+          </a:lnRef>
+          <a:fillRef idx="1">
+            <a:schemeClr val="accent1"/>
+          </a:fillRef>
+          <a:effectRef idx="0">
+            <a:schemeClr val="accent1"/>
+          </a:effectRef>
+          <a:fontRef idx="minor">
+            <a:schemeClr val="lt1"/>
+          </a:fontRef>
+        </p:style>
+        <p:txBody>
+          <a:bodyPr rtlCol="0" anchor="ctr"/>
+          <a:lstStyle/>
+          <a:p>
+            <a:pPr algn="ctr"/>
+            <a:endParaRPr lang="en-US"/>
+          </a:p>
+        </p:txBody>
+      </p:sp>
+      <p:sp>
+        <p:nvSpPr>
+          <p:cNvPr id="11" name="Oval 10">
+            <a:extLst>
+              <a:ext uri="{FF2B5EF4-FFF2-40B4-BE49-F238E27FC236}">
+                <a16:creationId xmlns:a16="http://schemas.microsoft.com/office/drawing/2014/main" id="{DAA165A3-7217-4064-ABBB-0908D3F9304A}"/>
+              </a:ext>
+            </a:extLst>
+          </p:cNvPr>
+          <p:cNvSpPr/>
+          <p:nvPr/>
+        </p:nvSpPr>
+        <p:spPr>
+          <a:xfrm>
+            <a:off x="8233237" y="4712679"/>
+            <a:ext cx="548640" cy="548640"/>
+          </a:xfrm>
+          <a:prstGeom prst="ellipse">
+            <a:avLst/>
+          </a:prstGeom>
+          <a:solidFill>
+            <a:schemeClr val="bg1">
+              <a:lumMod val="65000"/>
+            </a:schemeClr>
+          </a:solidFill>
+          <a:ln>
+            <a:solidFill>
+              <a:schemeClr val="bg1">
+                <a:lumMod val="65000"/>
+              </a:schemeClr>
+            </a:solidFill>
+          </a:ln>
+        </p:spPr>
+        <p:style>
+          <a:lnRef idx="2">
+            <a:schemeClr val="accent1">
+              <a:shade val="50000"/>
+            </a:schemeClr>
+          </a:lnRef>
+          <a:fillRef idx="1">
+            <a:schemeClr val="accent1"/>
+          </a:fillRef>
+          <a:effectRef idx="0">
+            <a:schemeClr val="accent1"/>
+          </a:effectRef>
+          <a:fontRef idx="minor">
+            <a:schemeClr val="lt1"/>
+          </a:fontRef>
+        </p:style>
+        <p:txBody>
+          <a:bodyPr rtlCol="0" anchor="ctr"/>
+          <a:lstStyle/>
+          <a:p>
+            <a:pPr algn="ctr"/>
+            <a:endParaRPr lang="en-US"/>
+          </a:p>
+        </p:txBody>
+      </p:sp>
+      <p:sp>
+        <p:nvSpPr>
+          <p:cNvPr id="12" name="Oval 11">
+            <a:extLst>
+              <a:ext uri="{FF2B5EF4-FFF2-40B4-BE49-F238E27FC236}">
+                <a16:creationId xmlns:a16="http://schemas.microsoft.com/office/drawing/2014/main" id="{246F53E2-7237-468D-A46F-D774148943AE}"/>
+              </a:ext>
+            </a:extLst>
+          </p:cNvPr>
+          <p:cNvSpPr/>
+          <p:nvPr/>
+        </p:nvSpPr>
+        <p:spPr>
+          <a:xfrm>
+            <a:off x="3838804" y="1467538"/>
+            <a:ext cx="182880" cy="182880"/>
+          </a:xfrm>
+          <a:prstGeom prst="ellipse">
+            <a:avLst/>
+          </a:prstGeom>
+          <a:solidFill>
+            <a:schemeClr val="bg1">
+              <a:lumMod val="65000"/>
+            </a:schemeClr>
+          </a:solidFill>
+          <a:ln>
+            <a:solidFill>
+              <a:schemeClr val="bg1">
+                <a:lumMod val="65000"/>
+              </a:schemeClr>
+            </a:solidFill>
+          </a:ln>
+        </p:spPr>
+        <p:style>
+          <a:lnRef idx="2">
+            <a:schemeClr val="accent1">
+              <a:shade val="50000"/>
+            </a:schemeClr>
+          </a:lnRef>
+          <a:fillRef idx="1">
+            <a:schemeClr val="accent1"/>
+          </a:fillRef>
+          <a:effectRef idx="0">
+            <a:schemeClr val="accent1"/>
+          </a:effectRef>
+          <a:fontRef idx="minor">
+            <a:schemeClr val="lt1"/>
+          </a:fontRef>
+        </p:style>
+        <p:txBody>
+          <a:bodyPr rtlCol="0" anchor="ctr"/>
+          <a:lstStyle/>
+          <a:p>
+            <a:pPr algn="ctr"/>
+            <a:endParaRPr lang="en-US"/>
+          </a:p>
+        </p:txBody>
+      </p:sp>
+      <p:sp>
+        <p:nvSpPr>
+          <p:cNvPr id="13" name="Oval 12">
+            <a:extLst>
+              <a:ext uri="{FF2B5EF4-FFF2-40B4-BE49-F238E27FC236}">
+                <a16:creationId xmlns:a16="http://schemas.microsoft.com/office/drawing/2014/main" id="{C9840180-3891-4AA4-B1AF-AFE262AEDF10}"/>
+              </a:ext>
+            </a:extLst>
+          </p:cNvPr>
+          <p:cNvSpPr/>
+          <p:nvPr/>
+        </p:nvSpPr>
+        <p:spPr>
+          <a:xfrm>
+            <a:off x="3051636" y="3251718"/>
+            <a:ext cx="365760" cy="365760"/>
+          </a:xfrm>
+          <a:prstGeom prst="ellipse">
+            <a:avLst/>
+          </a:prstGeom>
+          <a:solidFill>
+            <a:schemeClr val="bg1">
+              <a:lumMod val="65000"/>
+            </a:schemeClr>
+          </a:solidFill>
+          <a:ln>
+            <a:solidFill>
+              <a:schemeClr val="bg1">
+                <a:lumMod val="65000"/>
+              </a:schemeClr>
+            </a:solidFill>
+          </a:ln>
+        </p:spPr>
+        <p:style>
+          <a:lnRef idx="2">
+            <a:schemeClr val="accent1">
+              <a:shade val="50000"/>
+            </a:schemeClr>
+          </a:lnRef>
+          <a:fillRef idx="1">
+            <a:schemeClr val="accent1"/>
+          </a:fillRef>
+          <a:effectRef idx="0">
+            <a:schemeClr val="accent1"/>
+          </a:effectRef>
+          <a:fontRef idx="minor">
+            <a:schemeClr val="lt1"/>
+          </a:fontRef>
+        </p:style>
+        <p:txBody>
+          <a:bodyPr rtlCol="0" anchor="ctr"/>
+          <a:lstStyle/>
+          <a:p>
+            <a:pPr algn="ctr"/>
+            <a:endParaRPr lang="en-US"/>
+          </a:p>
+        </p:txBody>
+      </p:sp>
+      <p:sp>
+        <p:nvSpPr>
+          <p:cNvPr id="14" name="Oval 13">
+            <a:extLst>
+              <a:ext uri="{FF2B5EF4-FFF2-40B4-BE49-F238E27FC236}">
+                <a16:creationId xmlns:a16="http://schemas.microsoft.com/office/drawing/2014/main" id="{7478957C-B4BD-4E88-B6E3-C5C75398642F}"/>
+              </a:ext>
+            </a:extLst>
+          </p:cNvPr>
+          <p:cNvSpPr/>
+          <p:nvPr/>
+        </p:nvSpPr>
+        <p:spPr>
+          <a:xfrm>
+            <a:off x="6123405" y="1467537"/>
+            <a:ext cx="401216" cy="354563"/>
+          </a:xfrm>
+          <a:prstGeom prst="ellipse">
+            <a:avLst/>
+          </a:prstGeom>
+          <a:solidFill>
+            <a:schemeClr val="bg1">
+              <a:lumMod val="65000"/>
+            </a:schemeClr>
+          </a:solidFill>
+          <a:ln>
+            <a:solidFill>
+              <a:schemeClr val="bg1">
+                <a:lumMod val="65000"/>
+              </a:schemeClr>
+            </a:solidFill>
+          </a:ln>
+        </p:spPr>
+        <p:style>
+          <a:lnRef idx="2">
+            <a:schemeClr val="accent1">
+              <a:shade val="50000"/>
+            </a:schemeClr>
+          </a:lnRef>
+          <a:fillRef idx="1">
+            <a:schemeClr val="accent1"/>
+          </a:fillRef>
+          <a:effectRef idx="0">
+            <a:schemeClr val="accent1"/>
+          </a:effectRef>
+          <a:fontRef idx="minor">
+            <a:schemeClr val="lt1"/>
+          </a:fontRef>
+        </p:style>
+        <p:txBody>
+          <a:bodyPr rtlCol="0" anchor="ctr"/>
+          <a:lstStyle/>
+          <a:p>
+            <a:pPr algn="ctr"/>
+            <a:endParaRPr lang="en-US"/>
+          </a:p>
+        </p:txBody>
+      </p:sp>
+      <p:sp>
+        <p:nvSpPr>
+          <p:cNvPr id="15" name="Oval 14">
+            <a:extLst>
+              <a:ext uri="{FF2B5EF4-FFF2-40B4-BE49-F238E27FC236}">
+                <a16:creationId xmlns:a16="http://schemas.microsoft.com/office/drawing/2014/main" id="{C9A1D4F3-C8CB-468B-89D8-8AAD22CABAEB}"/>
+              </a:ext>
+            </a:extLst>
+          </p:cNvPr>
+          <p:cNvSpPr/>
+          <p:nvPr/>
+        </p:nvSpPr>
+        <p:spPr>
+          <a:xfrm>
+            <a:off x="3317431" y="4664278"/>
+            <a:ext cx="182880" cy="182880"/>
+          </a:xfrm>
+          <a:prstGeom prst="ellipse">
+            <a:avLst/>
+          </a:prstGeom>
+          <a:solidFill>
+            <a:schemeClr val="bg1">
+              <a:lumMod val="65000"/>
+            </a:schemeClr>
+          </a:solidFill>
+          <a:ln>
+            <a:solidFill>
+              <a:schemeClr val="bg1">
+                <a:lumMod val="65000"/>
+              </a:schemeClr>
+            </a:solidFill>
+          </a:ln>
+        </p:spPr>
+        <p:style>
+          <a:lnRef idx="2">
+            <a:schemeClr val="accent1">
+              <a:shade val="50000"/>
+            </a:schemeClr>
+          </a:lnRef>
+          <a:fillRef idx="1">
+            <a:schemeClr val="accent1"/>
+          </a:fillRef>
+          <a:effectRef idx="0">
+            <a:schemeClr val="accent1"/>
+          </a:effectRef>
+          <a:fontRef idx="minor">
+            <a:schemeClr val="lt1"/>
+          </a:fontRef>
+        </p:style>
+        <p:txBody>
+          <a:bodyPr rtlCol="0" anchor="ctr"/>
+          <a:lstStyle/>
+          <a:p>
+            <a:pPr algn="ctr"/>
+            <a:endParaRPr lang="en-US"/>
+          </a:p>
+        </p:txBody>
+      </p:sp>
+      <p:sp>
+        <p:nvSpPr>
+          <p:cNvPr id="16" name="Oval 15">
+            <a:extLst>
+              <a:ext uri="{FF2B5EF4-FFF2-40B4-BE49-F238E27FC236}">
+                <a16:creationId xmlns:a16="http://schemas.microsoft.com/office/drawing/2014/main" id="{DCFDCC52-9E5B-4F65-BADE-7C6862CC10A3}"/>
+              </a:ext>
+            </a:extLst>
+          </p:cNvPr>
+          <p:cNvSpPr/>
+          <p:nvPr/>
+        </p:nvSpPr>
+        <p:spPr>
+          <a:xfrm>
+            <a:off x="9122470" y="1290255"/>
+            <a:ext cx="640080" cy="640080"/>
+          </a:xfrm>
+          <a:prstGeom prst="ellipse">
+            <a:avLst/>
+          </a:prstGeom>
+          <a:solidFill>
+            <a:schemeClr val="bg1">
+              <a:lumMod val="65000"/>
+            </a:schemeClr>
+          </a:solidFill>
+          <a:ln>
+            <a:solidFill>
+              <a:schemeClr val="bg1">
+                <a:lumMod val="65000"/>
+              </a:schemeClr>
+            </a:solidFill>
+          </a:ln>
+        </p:spPr>
+        <p:style>
+          <a:lnRef idx="2">
+            <a:schemeClr val="accent1">
+              <a:shade val="50000"/>
+            </a:schemeClr>
+          </a:lnRef>
+          <a:fillRef idx="1">
+            <a:schemeClr val="accent1"/>
+          </a:fillRef>
+          <a:effectRef idx="0">
+            <a:schemeClr val="accent1"/>
+          </a:effectRef>
+          <a:fontRef idx="minor">
+            <a:schemeClr val="lt1"/>
+          </a:fontRef>
+        </p:style>
+        <p:txBody>
+          <a:bodyPr rtlCol="0" anchor="ctr"/>
+          <a:lstStyle/>
+          <a:p>
+            <a:pPr algn="ctr"/>
+            <a:endParaRPr lang="en-US"/>
+          </a:p>
+        </p:txBody>
+      </p:sp>
+      <p:sp>
+        <p:nvSpPr>
+          <p:cNvPr id="17" name="TextBox 16">
+            <a:extLst>
+              <a:ext uri="{FF2B5EF4-FFF2-40B4-BE49-F238E27FC236}">
+                <a16:creationId xmlns:a16="http://schemas.microsoft.com/office/drawing/2014/main" id="{D717D228-C992-421A-B5BB-B04E1CC1DCA5}"/>
+              </a:ext>
+            </a:extLst>
+          </p:cNvPr>
+          <p:cNvSpPr txBox="1"/>
+          <p:nvPr/>
+        </p:nvSpPr>
+        <p:spPr>
+          <a:xfrm>
+            <a:off x="4097382" y="97522"/>
+            <a:ext cx="3680046" cy="584775"/>
+          </a:xfrm>
+          <a:prstGeom prst="rect">
+            <a:avLst/>
+          </a:prstGeom>
+          <a:noFill/>
+        </p:spPr>
+        <p:txBody>
+          <a:bodyPr wrap="none" rtlCol="0">
+            <a:spAutoFit/>
+          </a:bodyPr>
+          <a:lstStyle/>
+          <a:p>
+            <a:pPr algn="ctr"/>
+            <a:r>
+              <a:rPr lang="en-US" sz="3200" dirty="0">
+                <a:solidFill>
+                  <a:schemeClr val="bg1"/>
+                </a:solidFill>
+              </a:rPr>
+              <a:t>Ship </a:t>
+            </a:r>
+            <a:r>
+              <a:rPr lang="en-US" sz="3200" dirty="0" err="1">
+                <a:solidFill>
+                  <a:schemeClr val="bg1"/>
+                </a:solidFill>
+              </a:rPr>
+              <a:t>Movment</a:t>
+            </a:r>
+            <a:r>
+              <a:rPr lang="en-US" sz="3200" dirty="0">
+                <a:solidFill>
+                  <a:schemeClr val="bg1"/>
+                </a:solidFill>
+              </a:rPr>
+              <a:t>: Basic</a:t>
+            </a:r>
+            <a:endParaRPr lang="en-US" dirty="0">
+              <a:solidFill>
+                <a:schemeClr val="bg1"/>
+              </a:solidFill>
+            </a:endParaRPr>
+          </a:p>
+        </p:txBody>
+      </p:sp>
+      <p:grpSp>
+        <p:nvGrpSpPr>
+          <p:cNvPr id="22" name="Group 21">
+            <a:extLst>
+              <a:ext uri="{FF2B5EF4-FFF2-40B4-BE49-F238E27FC236}">
+                <a16:creationId xmlns:a16="http://schemas.microsoft.com/office/drawing/2014/main" id="{37BEDDE7-4021-49B4-90A9-CE469A103EDC}"/>
+              </a:ext>
+            </a:extLst>
+          </p:cNvPr>
+          <p:cNvGrpSpPr/>
+          <p:nvPr/>
+        </p:nvGrpSpPr>
+        <p:grpSpPr>
+          <a:xfrm>
+            <a:off x="5511904" y="2714275"/>
+            <a:ext cx="640080" cy="640080"/>
+            <a:chOff x="2015412" y="1744824"/>
+            <a:chExt cx="640080" cy="640080"/>
+          </a:xfrm>
+        </p:grpSpPr>
+        <p:sp>
+          <p:nvSpPr>
+            <p:cNvPr id="2" name="Oval 1">
+              <a:extLst>
+                <a:ext uri="{FF2B5EF4-FFF2-40B4-BE49-F238E27FC236}">
+                  <a16:creationId xmlns:a16="http://schemas.microsoft.com/office/drawing/2014/main" id="{6BF54936-D3CD-4558-B225-0836F71134D8}"/>
+                </a:ext>
+              </a:extLst>
+            </p:cNvPr>
+            <p:cNvSpPr>
+              <a:spLocks noChangeAspect="1"/>
+            </p:cNvSpPr>
+            <p:nvPr/>
+          </p:nvSpPr>
+          <p:spPr>
+            <a:xfrm>
+              <a:off x="2015412" y="1744824"/>
+              <a:ext cx="640080" cy="640080"/>
+            </a:xfrm>
+            <a:prstGeom prst="ellipse">
+              <a:avLst/>
+            </a:prstGeom>
+            <a:noFill/>
+            <a:ln>
+              <a:solidFill>
+                <a:srgbClr val="FF0000"/>
+              </a:solidFill>
+            </a:ln>
+          </p:spPr>
+          <p:style>
+            <a:lnRef idx="2">
+              <a:schemeClr val="accent1">
+                <a:shade val="50000"/>
+              </a:schemeClr>
+            </a:lnRef>
+            <a:fillRef idx="1">
+              <a:schemeClr val="accent1"/>
+            </a:fillRef>
+            <a:effectRef idx="0">
+              <a:schemeClr val="accent1"/>
+            </a:effectRef>
+            <a:fontRef idx="minor">
+              <a:schemeClr val="lt1"/>
+            </a:fontRef>
+          </p:style>
+          <p:txBody>
+            <a:bodyPr rtlCol="0" anchor="ctr"/>
+            <a:lstStyle/>
+            <a:p>
+              <a:pPr algn="ctr"/>
+              <a:endParaRPr lang="en-US"/>
+            </a:p>
+          </p:txBody>
+        </p:sp>
+        <p:cxnSp>
+          <p:nvCxnSpPr>
+            <p:cNvPr id="19" name="Straight Connector 18">
+              <a:extLst>
+                <a:ext uri="{FF2B5EF4-FFF2-40B4-BE49-F238E27FC236}">
+                  <a16:creationId xmlns:a16="http://schemas.microsoft.com/office/drawing/2014/main" id="{3DEAA90E-5A72-4D08-8CD7-D3CE54397A41}"/>
+                </a:ext>
+              </a:extLst>
+            </p:cNvPr>
+            <p:cNvCxnSpPr>
+              <a:stCxn id="2" idx="0"/>
+              <a:endCxn id="2" idx="4"/>
+            </p:cNvCxnSpPr>
+            <p:nvPr/>
+          </p:nvCxnSpPr>
+          <p:spPr>
+            <a:xfrm>
+              <a:off x="2335452" y="1744824"/>
+              <a:ext cx="0" cy="640080"/>
+            </a:xfrm>
+            <a:prstGeom prst="line">
+              <a:avLst/>
+            </a:prstGeom>
+            <a:ln>
+              <a:solidFill>
+                <a:srgbClr val="FF0000"/>
+              </a:solidFill>
+            </a:ln>
+          </p:spPr>
+          <p:style>
+            <a:lnRef idx="1">
+              <a:schemeClr val="accent1"/>
+            </a:lnRef>
+            <a:fillRef idx="0">
+              <a:schemeClr val="accent1"/>
+            </a:fillRef>
+            <a:effectRef idx="0">
+              <a:schemeClr val="accent1"/>
+            </a:effectRef>
+            <a:fontRef idx="minor">
+              <a:schemeClr val="tx1"/>
+            </a:fontRef>
+          </p:style>
+        </p:cxnSp>
+        <p:cxnSp>
+          <p:nvCxnSpPr>
+            <p:cNvPr id="21" name="Straight Connector 20">
+              <a:extLst>
+                <a:ext uri="{FF2B5EF4-FFF2-40B4-BE49-F238E27FC236}">
+                  <a16:creationId xmlns:a16="http://schemas.microsoft.com/office/drawing/2014/main" id="{1B96C074-5CB4-493F-BAEE-D9C54C2F0957}"/>
+                </a:ext>
+              </a:extLst>
+            </p:cNvPr>
+            <p:cNvCxnSpPr>
+              <a:stCxn id="2" idx="2"/>
+              <a:endCxn id="2" idx="6"/>
+            </p:cNvCxnSpPr>
+            <p:nvPr/>
+          </p:nvCxnSpPr>
+          <p:spPr>
+            <a:xfrm>
+              <a:off x="2015412" y="2064864"/>
+              <a:ext cx="640080" cy="0"/>
+            </a:xfrm>
+            <a:prstGeom prst="line">
+              <a:avLst/>
+            </a:prstGeom>
+            <a:ln>
+              <a:solidFill>
+                <a:srgbClr val="FF0000"/>
+              </a:solidFill>
+            </a:ln>
+          </p:spPr>
+          <p:style>
+            <a:lnRef idx="1">
+              <a:schemeClr val="accent1"/>
+            </a:lnRef>
+            <a:fillRef idx="0">
+              <a:schemeClr val="accent1"/>
+            </a:fillRef>
+            <a:effectRef idx="0">
+              <a:schemeClr val="accent1"/>
+            </a:effectRef>
+            <a:fontRef idx="minor">
+              <a:schemeClr val="tx1"/>
+            </a:fontRef>
+          </p:style>
+        </p:cxnSp>
+      </p:grpSp>
+      <p:sp>
+        <p:nvSpPr>
+          <p:cNvPr id="23" name="TextBox 22">
+            <a:extLst>
+              <a:ext uri="{FF2B5EF4-FFF2-40B4-BE49-F238E27FC236}">
+                <a16:creationId xmlns:a16="http://schemas.microsoft.com/office/drawing/2014/main" id="{174FDE56-DFDC-4645-AC36-85162AA5C8D9}"/>
+              </a:ext>
+            </a:extLst>
+          </p:cNvPr>
+          <p:cNvSpPr txBox="1"/>
+          <p:nvPr/>
+        </p:nvSpPr>
+        <p:spPr>
+          <a:xfrm>
+            <a:off x="136843" y="1173251"/>
+            <a:ext cx="2796857" cy="4555093"/>
+          </a:xfrm>
+          <a:prstGeom prst="rect">
+            <a:avLst/>
+          </a:prstGeom>
+          <a:noFill/>
+        </p:spPr>
+        <p:txBody>
+          <a:bodyPr wrap="square" rtlCol="0">
+            <a:spAutoFit/>
+          </a:bodyPr>
+          <a:lstStyle/>
+          <a:p>
+            <a:r>
+              <a:rPr lang="en-US" sz="1400" dirty="0">
+                <a:solidFill>
+                  <a:schemeClr val="bg1"/>
+                </a:solidFill>
+              </a:rPr>
+              <a:t>Since we are restricting the ship to only have forward thrust, the aiming and the movement will affect each other. </a:t>
+            </a:r>
+          </a:p>
+          <a:p>
+            <a:endParaRPr lang="en-US" sz="1400" dirty="0">
+              <a:solidFill>
+                <a:schemeClr val="bg1"/>
+              </a:solidFill>
+            </a:endParaRPr>
+          </a:p>
+          <a:p>
+            <a:r>
+              <a:rPr lang="en-US" sz="1400" dirty="0">
+                <a:solidFill>
+                  <a:schemeClr val="bg1"/>
+                </a:solidFill>
+              </a:rPr>
+              <a:t>The basic target selection algorithm will rank targets as a function of their distance. There are some obvious problems with this (like what about the size of the asteroids? Should you shoot and break a close asteroid and make more small pieces to deal with?)</a:t>
+            </a:r>
+          </a:p>
+          <a:p>
+            <a:endParaRPr lang="en-US" sz="1400" dirty="0">
+              <a:solidFill>
+                <a:schemeClr val="bg1"/>
+              </a:solidFill>
+            </a:endParaRPr>
+          </a:p>
+          <a:p>
+            <a:r>
+              <a:rPr lang="en-US" sz="1400" dirty="0">
+                <a:solidFill>
+                  <a:schemeClr val="bg1"/>
+                </a:solidFill>
+              </a:rPr>
+              <a:t>Target selection doesn’t mean that we are shooting at it now. It just assigns a priority to the targets. The actual shooting will be done based on where the ship is pointing and where it needs to move to.</a:t>
+            </a:r>
+          </a:p>
+          <a:p>
+            <a:endParaRPr lang="en-US" sz="1000" dirty="0">
+              <a:solidFill>
+                <a:schemeClr val="bg1"/>
+              </a:solidFill>
+            </a:endParaRPr>
+          </a:p>
+        </p:txBody>
+      </p:sp>
+    </p:spTree>
+    <p:extLst>
+      <p:ext uri="{BB962C8B-B14F-4D97-AF65-F5344CB8AC3E}">
+        <p14:creationId xmlns:p14="http://schemas.microsoft.com/office/powerpoint/2010/main" val="2448199287"/>
       </p:ext>
     </p:extLst>
   </p:cSld>

</xml_diff>

<commit_message>
Moved Bullet Logic to Its Own Thing
DETAILED AS POSSIBLE
</commit_message>
<xml_diff>
--- a/GameDesignDocuments/GameDesignFigureMaker.pptx
+++ b/GameDesignDocuments/GameDesignFigureMaker.pptx
@@ -12,8 +12,8 @@
     <p:sldId id="259" r:id="rId6"/>
     <p:sldId id="262" r:id="rId7"/>
     <p:sldId id="264" r:id="rId8"/>
-    <p:sldId id="261" r:id="rId9"/>
-    <p:sldId id="263" r:id="rId10"/>
+    <p:sldId id="263" r:id="rId9"/>
+    <p:sldId id="261" r:id="rId10"/>
   </p:sldIdLst>
   <p:sldSz cx="12192000" cy="6858000"/>
   <p:notesSz cx="6858000" cy="9144000"/>
@@ -8887,8 +8887,8 @@
           </p:sp>
         </mc:Fallback>
       </mc:AlternateContent>
-      <mc:AlternateContent xmlns:mc="http://schemas.openxmlformats.org/markup-compatibility/2006">
-        <mc:Choice xmlns:a14="http://schemas.microsoft.com/office/drawing/2010/main" Requires="a14">
+      <mc:AlternateContent xmlns:mc="http://schemas.openxmlformats.org/markup-compatibility/2006" xmlns:a14="http://schemas.microsoft.com/office/drawing/2010/main">
+        <mc:Choice Requires="a14">
           <p:sp>
             <p:nvSpPr>
               <p:cNvPr id="46" name="TextBox 45">
@@ -8951,7 +8951,7 @@
             </p:txBody>
           </p:sp>
         </mc:Choice>
-        <mc:Fallback>
+        <mc:Fallback xmlns="">
           <p:sp>
             <p:nvSpPr>
               <p:cNvPr id="46" name="TextBox 45">
@@ -9670,8 +9670,8 @@
         </p:nvSpPr>
         <p:spPr>
           <a:xfrm>
-            <a:off x="3991997" y="97522"/>
-            <a:ext cx="3890810" cy="584775"/>
+            <a:off x="4097382" y="97522"/>
+            <a:ext cx="3680046" cy="584775"/>
           </a:xfrm>
           <a:prstGeom prst="rect">
             <a:avLst/>
@@ -9691,7 +9691,23 @@
                   <a:schemeClr val="bg1"/>
                 </a:solidFill>
               </a:rPr>
-              <a:t>Target Selection: Basic</a:t>
+              <a:t>Ship </a:t>
+            </a:r>
+            <a:r>
+              <a:rPr lang="en-US" sz="3200" dirty="0" err="1">
+                <a:solidFill>
+                  <a:schemeClr val="bg1"/>
+                </a:solidFill>
+              </a:rPr>
+              <a:t>Movment</a:t>
+            </a:r>
+            <a:r>
+              <a:rPr lang="en-US" sz="3200" dirty="0">
+                <a:solidFill>
+                  <a:schemeClr val="bg1"/>
+                </a:solidFill>
+              </a:rPr>
+              <a:t>: Basic</a:t>
             </a:r>
             <a:endParaRPr lang="en-US" dirty="0">
               <a:solidFill>
@@ -9947,7 +9963,7 @@
     </p:spTree>
     <p:extLst>
       <p:ext uri="{BB962C8B-B14F-4D97-AF65-F5344CB8AC3E}">
-        <p14:creationId xmlns:p14="http://schemas.microsoft.com/office/powerpoint/2010/main" val="3705736557"/>
+        <p14:creationId xmlns:p14="http://schemas.microsoft.com/office/powerpoint/2010/main" val="2448199287"/>
       </p:ext>
     </p:extLst>
   </p:cSld>
@@ -10050,7 +10066,7 @@
         </p:nvSpPr>
         <p:spPr>
           <a:xfrm>
-            <a:off x="7415310" y="2065953"/>
+            <a:off x="6763312" y="3099589"/>
             <a:ext cx="401216" cy="354563"/>
           </a:xfrm>
           <a:prstGeom prst="ellipse">
@@ -10574,8 +10590,8 @@
         </p:nvSpPr>
         <p:spPr>
           <a:xfrm>
-            <a:off x="4097382" y="97522"/>
-            <a:ext cx="3680046" cy="584775"/>
+            <a:off x="3991997" y="97522"/>
+            <a:ext cx="3890810" cy="584775"/>
           </a:xfrm>
           <a:prstGeom prst="rect">
             <a:avLst/>
@@ -10595,23 +10611,7 @@
                   <a:schemeClr val="bg1"/>
                 </a:solidFill>
               </a:rPr>
-              <a:t>Ship </a:t>
-            </a:r>
-            <a:r>
-              <a:rPr lang="en-US" sz="3200" dirty="0" err="1">
-                <a:solidFill>
-                  <a:schemeClr val="bg1"/>
-                </a:solidFill>
-              </a:rPr>
-              <a:t>Movment</a:t>
-            </a:r>
-            <a:r>
-              <a:rPr lang="en-US" sz="3200" dirty="0">
-                <a:solidFill>
-                  <a:schemeClr val="bg1"/>
-                </a:solidFill>
-              </a:rPr>
-              <a:t>: Basic</a:t>
+              <a:t>Target Selection: Basic</a:t>
             </a:r>
             <a:endParaRPr lang="en-US" dirty="0">
               <a:solidFill>
@@ -10799,7 +10799,7 @@
         <p:spPr>
           <a:xfrm>
             <a:off x="136843" y="1173251"/>
-            <a:ext cx="2796857" cy="4555093"/>
+            <a:ext cx="2796857" cy="4985980"/>
           </a:xfrm>
           <a:prstGeom prst="rect">
             <a:avLst/>
@@ -10856,6 +10856,39 @@
             </a:r>
           </a:p>
           <a:p>
+            <a:endParaRPr lang="en-US" sz="1400" dirty="0">
+              <a:solidFill>
+                <a:schemeClr val="bg1"/>
+              </a:solidFill>
+            </a:endParaRPr>
+          </a:p>
+          <a:p>
+            <a:r>
+              <a:rPr lang="en-US" sz="1400" dirty="0">
+                <a:solidFill>
+                  <a:schemeClr val="bg1"/>
+                </a:solidFill>
+              </a:rPr>
+              <a:t>Physics 2D </a:t>
+            </a:r>
+            <a:r>
+              <a:rPr lang="en-US" sz="1400" dirty="0" err="1">
+                <a:solidFill>
+                  <a:schemeClr val="bg1"/>
+                </a:solidFill>
+              </a:rPr>
+              <a:t>raycast</a:t>
+            </a:r>
+            <a:r>
+              <a:rPr lang="en-US" sz="1400" dirty="0">
+                <a:solidFill>
+                  <a:schemeClr val="bg1"/>
+                </a:solidFill>
+              </a:rPr>
+              <a:t> things</a:t>
+            </a:r>
+          </a:p>
+          <a:p>
             <a:endParaRPr lang="en-US" sz="1000" dirty="0">
               <a:solidFill>
                 <a:schemeClr val="bg1"/>
@@ -10864,10 +10897,186 @@
           </a:p>
         </p:txBody>
       </p:sp>
+      <p:cxnSp>
+        <p:nvCxnSpPr>
+          <p:cNvPr id="6" name="Straight Connector 5">
+            <a:extLst>
+              <a:ext uri="{FF2B5EF4-FFF2-40B4-BE49-F238E27FC236}">
+                <a16:creationId xmlns:a16="http://schemas.microsoft.com/office/drawing/2014/main" id="{EC79738C-C89C-41BA-B047-C414D63DABD2}"/>
+              </a:ext>
+            </a:extLst>
+          </p:cNvPr>
+          <p:cNvCxnSpPr/>
+          <p:nvPr/>
+        </p:nvCxnSpPr>
+        <p:spPr>
+          <a:xfrm>
+            <a:off x="5694784" y="1065402"/>
+            <a:ext cx="0" cy="5360565"/>
+          </a:xfrm>
+          <a:prstGeom prst="line">
+            <a:avLst/>
+          </a:prstGeom>
+        </p:spPr>
+        <p:style>
+          <a:lnRef idx="1">
+            <a:schemeClr val="accent1"/>
+          </a:lnRef>
+          <a:fillRef idx="0">
+            <a:schemeClr val="accent1"/>
+          </a:fillRef>
+          <a:effectRef idx="0">
+            <a:schemeClr val="accent1"/>
+          </a:effectRef>
+          <a:fontRef idx="minor">
+            <a:schemeClr val="tx1"/>
+          </a:fontRef>
+        </p:style>
+      </p:cxnSp>
+      <p:cxnSp>
+        <p:nvCxnSpPr>
+          <p:cNvPr id="20" name="Straight Connector 19">
+            <a:extLst>
+              <a:ext uri="{FF2B5EF4-FFF2-40B4-BE49-F238E27FC236}">
+                <a16:creationId xmlns:a16="http://schemas.microsoft.com/office/drawing/2014/main" id="{B96F61AA-C4FA-4E74-A3E6-A803C5D51574}"/>
+              </a:ext>
+            </a:extLst>
+          </p:cNvPr>
+          <p:cNvCxnSpPr>
+            <a:cxnSpLocks/>
+          </p:cNvCxnSpPr>
+          <p:nvPr/>
+        </p:nvCxnSpPr>
+        <p:spPr>
+          <a:xfrm flipH="1">
+            <a:off x="3171039" y="4076700"/>
+            <a:ext cx="6591511" cy="64344"/>
+          </a:xfrm>
+          <a:prstGeom prst="line">
+            <a:avLst/>
+          </a:prstGeom>
+        </p:spPr>
+        <p:style>
+          <a:lnRef idx="1">
+            <a:schemeClr val="accent1"/>
+          </a:lnRef>
+          <a:fillRef idx="0">
+            <a:schemeClr val="accent1"/>
+          </a:fillRef>
+          <a:effectRef idx="0">
+            <a:schemeClr val="accent1"/>
+          </a:effectRef>
+          <a:fontRef idx="minor">
+            <a:schemeClr val="tx1"/>
+          </a:fontRef>
+        </p:style>
+      </p:cxnSp>
+      <p:sp>
+        <p:nvSpPr>
+          <p:cNvPr id="26" name="Oval 25">
+            <a:extLst>
+              <a:ext uri="{FF2B5EF4-FFF2-40B4-BE49-F238E27FC236}">
+                <a16:creationId xmlns:a16="http://schemas.microsoft.com/office/drawing/2014/main" id="{D1B83094-040B-467A-873F-AE2240E6BE1F}"/>
+              </a:ext>
+            </a:extLst>
+          </p:cNvPr>
+          <p:cNvSpPr/>
+          <p:nvPr/>
+        </p:nvSpPr>
+        <p:spPr>
+          <a:xfrm>
+            <a:off x="4976349" y="3364656"/>
+            <a:ext cx="1426128" cy="1495337"/>
+          </a:xfrm>
+          <a:prstGeom prst="ellipse">
+            <a:avLst/>
+          </a:prstGeom>
+          <a:solidFill>
+            <a:srgbClr val="E39689">
+              <a:alpha val="40000"/>
+            </a:srgbClr>
+          </a:solidFill>
+        </p:spPr>
+        <p:style>
+          <a:lnRef idx="2">
+            <a:schemeClr val="accent1">
+              <a:shade val="50000"/>
+            </a:schemeClr>
+          </a:lnRef>
+          <a:fillRef idx="1">
+            <a:schemeClr val="accent1"/>
+          </a:fillRef>
+          <a:effectRef idx="0">
+            <a:schemeClr val="accent1"/>
+          </a:effectRef>
+          <a:fontRef idx="minor">
+            <a:schemeClr val="lt1"/>
+          </a:fontRef>
+        </p:style>
+        <p:txBody>
+          <a:bodyPr rtlCol="0" anchor="ctr"/>
+          <a:lstStyle/>
+          <a:p>
+            <a:pPr algn="ctr"/>
+            <a:endParaRPr lang="en-US"/>
+          </a:p>
+        </p:txBody>
+      </p:sp>
+      <p:sp>
+        <p:nvSpPr>
+          <p:cNvPr id="27" name="Oval 26">
+            <a:extLst>
+              <a:ext uri="{FF2B5EF4-FFF2-40B4-BE49-F238E27FC236}">
+                <a16:creationId xmlns:a16="http://schemas.microsoft.com/office/drawing/2014/main" id="{3FA43F3B-B1D7-4244-A633-5ADC50ECDE31}"/>
+              </a:ext>
+            </a:extLst>
+          </p:cNvPr>
+          <p:cNvSpPr/>
+          <p:nvPr/>
+        </p:nvSpPr>
+        <p:spPr>
+          <a:xfrm>
+            <a:off x="4468314" y="2831605"/>
+            <a:ext cx="2442197" cy="2527627"/>
+          </a:xfrm>
+          <a:prstGeom prst="ellipse">
+            <a:avLst/>
+          </a:prstGeom>
+          <a:solidFill>
+            <a:schemeClr val="accent6">
+              <a:alpha val="14000"/>
+            </a:schemeClr>
+          </a:solidFill>
+        </p:spPr>
+        <p:style>
+          <a:lnRef idx="2">
+            <a:schemeClr val="accent1">
+              <a:shade val="50000"/>
+            </a:schemeClr>
+          </a:lnRef>
+          <a:fillRef idx="1">
+            <a:schemeClr val="accent1"/>
+          </a:fillRef>
+          <a:effectRef idx="0">
+            <a:schemeClr val="accent1"/>
+          </a:effectRef>
+          <a:fontRef idx="minor">
+            <a:schemeClr val="lt1"/>
+          </a:fontRef>
+        </p:style>
+        <p:txBody>
+          <a:bodyPr rtlCol="0" anchor="ctr"/>
+          <a:lstStyle/>
+          <a:p>
+            <a:pPr algn="ctr"/>
+            <a:endParaRPr lang="en-US"/>
+          </a:p>
+        </p:txBody>
+      </p:sp>
     </p:spTree>
     <p:extLst>
       <p:ext uri="{BB962C8B-B14F-4D97-AF65-F5344CB8AC3E}">
-        <p14:creationId xmlns:p14="http://schemas.microsoft.com/office/powerpoint/2010/main" val="2448199287"/>
+        <p14:creationId xmlns:p14="http://schemas.microsoft.com/office/powerpoint/2010/main" val="3705736557"/>
       </p:ext>
     </p:extLst>
   </p:cSld>

</xml_diff>